<commit_message>
Finished the jupyter notebook with all exercises.
</commit_message>
<xml_diff>
--- a/Week 1 - Mathematic introduction/Week1_learning_goals_material.pptx
+++ b/Week 1 - Mathematic introduction/Week1_learning_goals_material.pptx
@@ -8,6 +8,12 @@
     <p:sldId id="256" r:id="rId2"/>
     <p:sldId id="257" r:id="rId3"/>
     <p:sldId id="258" r:id="rId4"/>
+    <p:sldId id="259" r:id="rId5"/>
+    <p:sldId id="260" r:id="rId6"/>
+    <p:sldId id="261" r:id="rId7"/>
+    <p:sldId id="262" r:id="rId8"/>
+    <p:sldId id="263" r:id="rId9"/>
+    <p:sldId id="264" r:id="rId10"/>
   </p:sldIdLst>
   <p:sldSz cx="12192000" cy="6858000"/>
   <p:notesSz cx="6858000" cy="9144000"/>
@@ -2950,10 +2956,17 @@
           <a:lstStyle/>
           <a:p>
             <a:r>
-              <a:rPr lang="en-GB" sz="4600" b="1" dirty="0"/>
+              <a:rPr lang="en-GB" sz="7200" b="1" dirty="0"/>
               <a:t>WEEK 1</a:t>
             </a:r>
-            <a:endParaRPr lang="en-CH" sz="4600" dirty="0"/>
+            <a:br>
+              <a:rPr lang="en-GB" sz="7200" b="1" dirty="0"/>
+            </a:br>
+            <a:r>
+              <a:rPr lang="en-GB" sz="4400" b="1" dirty="0"/>
+              <a:t>Introduction to linear algebra and numpy/Python</a:t>
+            </a:r>
+            <a:endParaRPr lang="en-CH" sz="7200" dirty="0"/>
           </a:p>
         </p:txBody>
       </p:sp>
@@ -2975,7 +2988,7 @@
         </p:nvSpPr>
         <p:spPr>
           <a:xfrm>
-            <a:off x="1524000" y="4118088"/>
+            <a:off x="1524000" y="4544806"/>
             <a:ext cx="9144000" cy="1393711"/>
           </a:xfrm>
         </p:spPr>
@@ -2986,8 +2999,8 @@
           <a:lstStyle/>
           <a:p>
             <a:r>
-              <a:rPr lang="en-GB" b="1" dirty="0"/>
-              <a:t>Learning Goals and materials</a:t>
+              <a:rPr lang="en-GB" sz="4000" b="1" dirty="0"/>
+              <a:t>Learning Goals</a:t>
             </a:r>
           </a:p>
         </p:txBody>
@@ -3067,9 +3080,16 @@
             <p:ph idx="1"/>
           </p:nvPr>
         </p:nvSpPr>
-        <p:spPr/>
+        <p:spPr>
+          <a:xfrm>
+            <a:off x="838200" y="1690688"/>
+            <a:ext cx="10515600" cy="4486275"/>
+          </a:xfrm>
+        </p:spPr>
         <p:txBody>
-          <a:bodyPr/>
+          <a:bodyPr>
+            <a:normAutofit lnSpcReduction="10000"/>
+          </a:bodyPr>
           <a:lstStyle/>
           <a:p>
             <a:pPr>
@@ -3381,6 +3401,93 @@
             <a:r>
               <a:rPr lang="de-CH" dirty="0" err="1"/>
               <a:t>arrays</a:t>
+            </a:r>
+            <a:endParaRPr lang="de-CH" dirty="0"/>
+          </a:p>
+          <a:p>
+            <a:pPr>
+              <a:buFont typeface="Wingdings" panose="05000000000000000000" pitchFamily="2" charset="2"/>
+              <a:buChar char="q"/>
+            </a:pPr>
+            <a:r>
+              <a:rPr lang="de-CH" dirty="0"/>
+              <a:t> The </a:t>
+            </a:r>
+            <a:r>
+              <a:rPr lang="de-CH" dirty="0" err="1"/>
+              <a:t>student</a:t>
+            </a:r>
+            <a:r>
+              <a:rPr lang="de-CH" dirty="0"/>
+              <a:t> is </a:t>
+            </a:r>
+            <a:r>
+              <a:rPr lang="de-CH" dirty="0" err="1"/>
+              <a:t>able</a:t>
+            </a:r>
+            <a:r>
+              <a:rPr lang="de-CH" dirty="0"/>
+              <a:t> to </a:t>
+            </a:r>
+            <a:r>
+              <a:rPr lang="de-CH" dirty="0" err="1"/>
+              <a:t>use</a:t>
+            </a:r>
+            <a:r>
+              <a:rPr lang="de-CH" dirty="0"/>
+              <a:t> </a:t>
+            </a:r>
+            <a:r>
+              <a:rPr lang="de-CH" dirty="0" err="1"/>
+              <a:t>the</a:t>
+            </a:r>
+            <a:r>
+              <a:rPr lang="de-CH" dirty="0"/>
+              <a:t> </a:t>
+            </a:r>
+            <a:r>
+              <a:rPr lang="de-CH" dirty="0" err="1"/>
+              <a:t>concepts</a:t>
+            </a:r>
+            <a:r>
+              <a:rPr lang="de-CH" dirty="0"/>
+              <a:t> to </a:t>
+            </a:r>
+            <a:r>
+              <a:rPr lang="de-CH" dirty="0" err="1"/>
+              <a:t>implement</a:t>
+            </a:r>
+            <a:r>
+              <a:rPr lang="de-CH" dirty="0"/>
+              <a:t> a </a:t>
+            </a:r>
+            <a:r>
+              <a:rPr lang="de-CH" dirty="0" err="1"/>
+              <a:t>complete</a:t>
+            </a:r>
+            <a:r>
+              <a:rPr lang="de-CH" dirty="0"/>
+              <a:t> linear </a:t>
+            </a:r>
+            <a:r>
+              <a:rPr lang="de-CH" dirty="0" err="1"/>
+              <a:t>regression</a:t>
+            </a:r>
+            <a:r>
+              <a:rPr lang="de-CH" dirty="0"/>
+              <a:t> </a:t>
+            </a:r>
+            <a:r>
+              <a:rPr lang="de-CH" dirty="0" err="1"/>
+              <a:t>model</a:t>
+            </a:r>
+            <a:r>
+              <a:rPr lang="de-CH" dirty="0"/>
+              <a:t> from </a:t>
+            </a:r>
+            <a:r>
+              <a:rPr lang="de-CH" dirty="0" err="1"/>
+              <a:t>scratch</a:t>
             </a:r>
             <a:endParaRPr lang="de-CH" dirty="0"/>
           </a:p>
@@ -3396,6 +3503,2970 @@
     <p:extLst>
       <p:ext uri="{BB962C8B-B14F-4D97-AF65-F5344CB8AC3E}">
         <p14:creationId xmlns:p14="http://schemas.microsoft.com/office/powerpoint/2010/main" val="968159166"/>
+      </p:ext>
+    </p:extLst>
+  </p:cSld>
+  <p:clrMapOvr>
+    <a:masterClrMapping/>
+  </p:clrMapOvr>
+</p:sld>
+</file>
+
+<file path=ppt/slides/slide4.xml><?xml version="1.0" encoding="utf-8"?>
+<p:sld xmlns:a="http://schemas.openxmlformats.org/drawingml/2006/main" xmlns:r="http://schemas.openxmlformats.org/officeDocument/2006/relationships" xmlns:p="http://schemas.openxmlformats.org/presentationml/2006/main">
+  <p:cSld>
+    <p:spTree>
+      <p:nvGrpSpPr>
+        <p:cNvPr id="1" name=""/>
+        <p:cNvGrpSpPr/>
+        <p:nvPr/>
+      </p:nvGrpSpPr>
+      <p:grpSpPr>
+        <a:xfrm>
+          <a:off x="0" y="0"/>
+          <a:ext cx="0" cy="0"/>
+          <a:chOff x="0" y="0"/>
+          <a:chExt cx="0" cy="0"/>
+        </a:xfrm>
+      </p:grpSpPr>
+      <p:sp>
+        <p:nvSpPr>
+          <p:cNvPr id="2" name="Title 1">
+            <a:extLst>
+              <a:ext uri="{FF2B5EF4-FFF2-40B4-BE49-F238E27FC236}">
+                <a16:creationId xmlns:a16="http://schemas.microsoft.com/office/drawing/2014/main" id="{D58A28C4-517E-44E4-9BD7-024C12BB4A4F}"/>
+              </a:ext>
+            </a:extLst>
+          </p:cNvPr>
+          <p:cNvSpPr>
+            <a:spLocks noGrp="1"/>
+          </p:cNvSpPr>
+          <p:nvPr>
+            <p:ph type="title"/>
+          </p:nvPr>
+        </p:nvSpPr>
+        <p:spPr/>
+        <p:txBody>
+          <a:bodyPr/>
+          <a:lstStyle/>
+          <a:p>
+            <a:r>
+              <a:rPr lang="de-CH" dirty="0"/>
+              <a:t>Learning Goals</a:t>
+            </a:r>
+            <a:endParaRPr lang="en-CH" dirty="0"/>
+          </a:p>
+        </p:txBody>
+      </p:sp>
+      <p:sp>
+        <p:nvSpPr>
+          <p:cNvPr id="3" name="Content Placeholder 2">
+            <a:extLst>
+              <a:ext uri="{FF2B5EF4-FFF2-40B4-BE49-F238E27FC236}">
+                <a16:creationId xmlns:a16="http://schemas.microsoft.com/office/drawing/2014/main" id="{20FB50C2-9865-4C24-8D48-F7BF0D6C2901}"/>
+              </a:ext>
+            </a:extLst>
+          </p:cNvPr>
+          <p:cNvSpPr>
+            <a:spLocks noGrp="1"/>
+          </p:cNvSpPr>
+          <p:nvPr>
+            <p:ph idx="1"/>
+          </p:nvPr>
+        </p:nvSpPr>
+        <p:spPr>
+          <a:xfrm>
+            <a:off x="838200" y="1690688"/>
+            <a:ext cx="10515600" cy="4486275"/>
+          </a:xfrm>
+        </p:spPr>
+        <p:txBody>
+          <a:bodyPr>
+            <a:normAutofit lnSpcReduction="10000"/>
+          </a:bodyPr>
+          <a:lstStyle/>
+          <a:p>
+            <a:pPr>
+              <a:buFont typeface="Wingdings" panose="05000000000000000000" pitchFamily="2" charset="2"/>
+              <a:buChar char="ü"/>
+            </a:pPr>
+            <a:r>
+              <a:rPr lang="de-CH" dirty="0"/>
+              <a:t> The </a:t>
+            </a:r>
+            <a:r>
+              <a:rPr lang="de-CH" dirty="0" err="1"/>
+              <a:t>student</a:t>
+            </a:r>
+            <a:r>
+              <a:rPr lang="de-CH" dirty="0"/>
+              <a:t> is </a:t>
+            </a:r>
+            <a:r>
+              <a:rPr lang="de-CH" dirty="0" err="1"/>
+              <a:t>able</a:t>
+            </a:r>
+            <a:r>
+              <a:rPr lang="de-CH" dirty="0"/>
+              <a:t> to </a:t>
+            </a:r>
+            <a:r>
+              <a:rPr lang="de-CH" dirty="0" err="1"/>
+              <a:t>explain</a:t>
+            </a:r>
+            <a:r>
+              <a:rPr lang="de-CH" dirty="0"/>
+              <a:t> what is a </a:t>
+            </a:r>
+            <a:r>
+              <a:rPr lang="de-CH" dirty="0" err="1"/>
+              <a:t>vector</a:t>
+            </a:r>
+            <a:r>
+              <a:rPr lang="de-CH" dirty="0"/>
+              <a:t> and a </a:t>
+            </a:r>
+            <a:r>
+              <a:rPr lang="de-CH" dirty="0" err="1"/>
+              <a:t>matrix</a:t>
+            </a:r>
+            <a:endParaRPr lang="de-CH" dirty="0"/>
+          </a:p>
+          <a:p>
+            <a:pPr>
+              <a:buFont typeface="Wingdings" panose="05000000000000000000" pitchFamily="2" charset="2"/>
+              <a:buChar char="q"/>
+            </a:pPr>
+            <a:r>
+              <a:rPr lang="de-CH" dirty="0"/>
+              <a:t> The </a:t>
+            </a:r>
+            <a:r>
+              <a:rPr lang="de-CH" dirty="0" err="1"/>
+              <a:t>student</a:t>
+            </a:r>
+            <a:r>
+              <a:rPr lang="de-CH" dirty="0"/>
+              <a:t> is </a:t>
+            </a:r>
+            <a:r>
+              <a:rPr lang="de-CH" dirty="0" err="1"/>
+              <a:t>able</a:t>
+            </a:r>
+            <a:r>
+              <a:rPr lang="de-CH" dirty="0"/>
+              <a:t> to </a:t>
+            </a:r>
+            <a:r>
+              <a:rPr lang="de-CH" dirty="0" err="1"/>
+              <a:t>understand</a:t>
+            </a:r>
+            <a:r>
+              <a:rPr lang="de-CH" dirty="0"/>
+              <a:t> </a:t>
+            </a:r>
+            <a:r>
+              <a:rPr lang="de-CH" dirty="0" err="1"/>
+              <a:t>the</a:t>
+            </a:r>
+            <a:r>
+              <a:rPr lang="de-CH" dirty="0"/>
+              <a:t> </a:t>
+            </a:r>
+            <a:r>
+              <a:rPr lang="de-CH" dirty="0" err="1"/>
+              <a:t>main</a:t>
+            </a:r>
+            <a:r>
+              <a:rPr lang="de-CH" dirty="0"/>
+              <a:t> </a:t>
+            </a:r>
+            <a:r>
+              <a:rPr lang="de-CH" dirty="0" err="1"/>
+              <a:t>operations</a:t>
+            </a:r>
+            <a:r>
+              <a:rPr lang="de-CH" dirty="0"/>
+              <a:t> you </a:t>
+            </a:r>
+            <a:r>
+              <a:rPr lang="de-CH" dirty="0" err="1"/>
+              <a:t>can</a:t>
+            </a:r>
+            <a:r>
+              <a:rPr lang="de-CH" dirty="0"/>
+              <a:t> perform on a </a:t>
+            </a:r>
+            <a:r>
+              <a:rPr lang="de-CH" dirty="0" err="1"/>
+              <a:t>vector</a:t>
+            </a:r>
+            <a:r>
+              <a:rPr lang="de-CH" dirty="0"/>
+              <a:t> and a </a:t>
+            </a:r>
+            <a:r>
+              <a:rPr lang="de-CH" dirty="0" err="1"/>
+              <a:t>matrix</a:t>
+            </a:r>
+            <a:endParaRPr lang="de-CH" dirty="0"/>
+          </a:p>
+          <a:p>
+            <a:pPr>
+              <a:buFont typeface="Wingdings" panose="05000000000000000000" pitchFamily="2" charset="2"/>
+              <a:buChar char="q"/>
+            </a:pPr>
+            <a:r>
+              <a:rPr lang="de-CH" dirty="0"/>
+              <a:t> The </a:t>
+            </a:r>
+            <a:r>
+              <a:rPr lang="de-CH" dirty="0" err="1"/>
+              <a:t>student</a:t>
+            </a:r>
+            <a:r>
+              <a:rPr lang="de-CH" dirty="0"/>
+              <a:t> is </a:t>
+            </a:r>
+            <a:r>
+              <a:rPr lang="de-CH" dirty="0" err="1"/>
+              <a:t>able</a:t>
+            </a:r>
+            <a:r>
+              <a:rPr lang="de-CH" dirty="0"/>
+              <a:t> to </a:t>
+            </a:r>
+            <a:r>
+              <a:rPr lang="de-CH" dirty="0" err="1"/>
+              <a:t>implement</a:t>
+            </a:r>
+            <a:r>
+              <a:rPr lang="de-CH" dirty="0"/>
+              <a:t> </a:t>
+            </a:r>
+            <a:r>
+              <a:rPr lang="de-CH" dirty="0" err="1"/>
+              <a:t>the</a:t>
+            </a:r>
+            <a:r>
+              <a:rPr lang="de-CH" dirty="0"/>
+              <a:t> </a:t>
+            </a:r>
+            <a:r>
+              <a:rPr lang="de-CH" dirty="0" err="1"/>
+              <a:t>main</a:t>
+            </a:r>
+            <a:r>
+              <a:rPr lang="de-CH" dirty="0"/>
+              <a:t> </a:t>
+            </a:r>
+            <a:r>
+              <a:rPr lang="de-CH" dirty="0" err="1"/>
+              <a:t>operations</a:t>
+            </a:r>
+            <a:r>
+              <a:rPr lang="de-CH" dirty="0"/>
+              <a:t> in </a:t>
+            </a:r>
+            <a:r>
+              <a:rPr lang="de-CH" dirty="0" err="1"/>
+              <a:t>basic</a:t>
+            </a:r>
+            <a:r>
+              <a:rPr lang="de-CH" dirty="0"/>
+              <a:t> Python</a:t>
+            </a:r>
+          </a:p>
+          <a:p>
+            <a:pPr>
+              <a:buFont typeface="Wingdings" panose="05000000000000000000" pitchFamily="2" charset="2"/>
+              <a:buChar char="q"/>
+            </a:pPr>
+            <a:r>
+              <a:rPr lang="de-CH" dirty="0"/>
+              <a:t> The </a:t>
+            </a:r>
+            <a:r>
+              <a:rPr lang="de-CH" dirty="0" err="1"/>
+              <a:t>student</a:t>
+            </a:r>
+            <a:r>
+              <a:rPr lang="de-CH" dirty="0"/>
+              <a:t> is </a:t>
+            </a:r>
+            <a:r>
+              <a:rPr lang="de-CH" dirty="0" err="1"/>
+              <a:t>able</a:t>
+            </a:r>
+            <a:r>
+              <a:rPr lang="de-CH" dirty="0"/>
+              <a:t> to </a:t>
+            </a:r>
+            <a:r>
+              <a:rPr lang="de-CH" dirty="0" err="1"/>
+              <a:t>implement</a:t>
+            </a:r>
+            <a:r>
+              <a:rPr lang="de-CH" dirty="0"/>
+              <a:t> </a:t>
+            </a:r>
+            <a:r>
+              <a:rPr lang="de-CH" dirty="0" err="1"/>
+              <a:t>the</a:t>
+            </a:r>
+            <a:r>
+              <a:rPr lang="de-CH" dirty="0"/>
+              <a:t> </a:t>
+            </a:r>
+            <a:r>
+              <a:rPr lang="de-CH" dirty="0" err="1"/>
+              <a:t>main</a:t>
+            </a:r>
+            <a:r>
+              <a:rPr lang="de-CH" dirty="0"/>
+              <a:t> </a:t>
+            </a:r>
+            <a:r>
+              <a:rPr lang="de-CH" dirty="0" err="1"/>
+              <a:t>operations</a:t>
+            </a:r>
+            <a:r>
+              <a:rPr lang="de-CH" dirty="0"/>
+              <a:t> in numpy</a:t>
+            </a:r>
+          </a:p>
+          <a:p>
+            <a:pPr>
+              <a:buFont typeface="Wingdings" panose="05000000000000000000" pitchFamily="2" charset="2"/>
+              <a:buChar char="q"/>
+            </a:pPr>
+            <a:r>
+              <a:rPr lang="de-CH" dirty="0"/>
+              <a:t> The </a:t>
+            </a:r>
+            <a:r>
+              <a:rPr lang="de-CH" dirty="0" err="1"/>
+              <a:t>student</a:t>
+            </a:r>
+            <a:r>
+              <a:rPr lang="de-CH" dirty="0"/>
+              <a:t> is </a:t>
+            </a:r>
+            <a:r>
+              <a:rPr lang="de-CH" dirty="0" err="1"/>
+              <a:t>able</a:t>
+            </a:r>
+            <a:r>
+              <a:rPr lang="de-CH" dirty="0"/>
+              <a:t> to </a:t>
+            </a:r>
+            <a:r>
+              <a:rPr lang="de-CH" dirty="0" err="1"/>
+              <a:t>understand</a:t>
+            </a:r>
+            <a:r>
+              <a:rPr lang="de-CH" dirty="0"/>
+              <a:t> </a:t>
+            </a:r>
+            <a:r>
+              <a:rPr lang="de-CH" dirty="0" err="1"/>
+              <a:t>the</a:t>
+            </a:r>
+            <a:r>
+              <a:rPr lang="de-CH" dirty="0"/>
+              <a:t> </a:t>
+            </a:r>
+            <a:r>
+              <a:rPr lang="de-CH" dirty="0" err="1"/>
+              <a:t>difference</a:t>
+            </a:r>
+            <a:r>
+              <a:rPr lang="de-CH" dirty="0"/>
+              <a:t> in how numpy </a:t>
+            </a:r>
+            <a:r>
+              <a:rPr lang="de-CH" dirty="0" err="1"/>
+              <a:t>operates</a:t>
+            </a:r>
+            <a:r>
+              <a:rPr lang="de-CH" dirty="0"/>
+              <a:t> on </a:t>
+            </a:r>
+            <a:r>
+              <a:rPr lang="de-CH" dirty="0" err="1"/>
+              <a:t>arrays</a:t>
+            </a:r>
+            <a:endParaRPr lang="de-CH" dirty="0"/>
+          </a:p>
+          <a:p>
+            <a:pPr>
+              <a:buFont typeface="Wingdings" panose="05000000000000000000" pitchFamily="2" charset="2"/>
+              <a:buChar char="q"/>
+            </a:pPr>
+            <a:r>
+              <a:rPr lang="de-CH" dirty="0"/>
+              <a:t> The </a:t>
+            </a:r>
+            <a:r>
+              <a:rPr lang="de-CH" dirty="0" err="1"/>
+              <a:t>student</a:t>
+            </a:r>
+            <a:r>
+              <a:rPr lang="de-CH" dirty="0"/>
+              <a:t> is </a:t>
+            </a:r>
+            <a:r>
+              <a:rPr lang="de-CH" dirty="0" err="1"/>
+              <a:t>able</a:t>
+            </a:r>
+            <a:r>
+              <a:rPr lang="de-CH" dirty="0"/>
+              <a:t> to </a:t>
+            </a:r>
+            <a:r>
+              <a:rPr lang="de-CH" dirty="0" err="1"/>
+              <a:t>use</a:t>
+            </a:r>
+            <a:r>
+              <a:rPr lang="de-CH" dirty="0"/>
+              <a:t> </a:t>
+            </a:r>
+            <a:r>
+              <a:rPr lang="de-CH" dirty="0" err="1"/>
+              <a:t>the</a:t>
+            </a:r>
+            <a:r>
+              <a:rPr lang="de-CH" dirty="0"/>
+              <a:t> </a:t>
+            </a:r>
+            <a:r>
+              <a:rPr lang="de-CH" dirty="0" err="1"/>
+              <a:t>concepts</a:t>
+            </a:r>
+            <a:r>
+              <a:rPr lang="de-CH" dirty="0"/>
+              <a:t> to </a:t>
+            </a:r>
+            <a:r>
+              <a:rPr lang="de-CH" dirty="0" err="1"/>
+              <a:t>implement</a:t>
+            </a:r>
+            <a:r>
+              <a:rPr lang="de-CH" dirty="0"/>
+              <a:t> a </a:t>
+            </a:r>
+            <a:r>
+              <a:rPr lang="de-CH" dirty="0" err="1"/>
+              <a:t>complete</a:t>
+            </a:r>
+            <a:r>
+              <a:rPr lang="de-CH" dirty="0"/>
+              <a:t> linear </a:t>
+            </a:r>
+            <a:r>
+              <a:rPr lang="de-CH" dirty="0" err="1"/>
+              <a:t>regression</a:t>
+            </a:r>
+            <a:r>
+              <a:rPr lang="de-CH" dirty="0"/>
+              <a:t> </a:t>
+            </a:r>
+            <a:r>
+              <a:rPr lang="de-CH" dirty="0" err="1"/>
+              <a:t>model</a:t>
+            </a:r>
+            <a:r>
+              <a:rPr lang="de-CH" dirty="0"/>
+              <a:t> from </a:t>
+            </a:r>
+            <a:r>
+              <a:rPr lang="de-CH" dirty="0" err="1"/>
+              <a:t>scratch</a:t>
+            </a:r>
+            <a:endParaRPr lang="de-CH" dirty="0"/>
+          </a:p>
+          <a:p>
+            <a:pPr marL="0" indent="0">
+              <a:buNone/>
+            </a:pPr>
+            <a:endParaRPr lang="en-CH" dirty="0"/>
+          </a:p>
+        </p:txBody>
+      </p:sp>
+    </p:spTree>
+    <p:extLst>
+      <p:ext uri="{BB962C8B-B14F-4D97-AF65-F5344CB8AC3E}">
+        <p14:creationId xmlns:p14="http://schemas.microsoft.com/office/powerpoint/2010/main" val="1180713814"/>
+      </p:ext>
+    </p:extLst>
+  </p:cSld>
+  <p:clrMapOvr>
+    <a:masterClrMapping/>
+  </p:clrMapOvr>
+</p:sld>
+</file>
+
+<file path=ppt/slides/slide5.xml><?xml version="1.0" encoding="utf-8"?>
+<p:sld xmlns:a="http://schemas.openxmlformats.org/drawingml/2006/main" xmlns:r="http://schemas.openxmlformats.org/officeDocument/2006/relationships" xmlns:p="http://schemas.openxmlformats.org/presentationml/2006/main">
+  <p:cSld>
+    <p:spTree>
+      <p:nvGrpSpPr>
+        <p:cNvPr id="1" name=""/>
+        <p:cNvGrpSpPr/>
+        <p:nvPr/>
+      </p:nvGrpSpPr>
+      <p:grpSpPr>
+        <a:xfrm>
+          <a:off x="0" y="0"/>
+          <a:ext cx="0" cy="0"/>
+          <a:chOff x="0" y="0"/>
+          <a:chExt cx="0" cy="0"/>
+        </a:xfrm>
+      </p:grpSpPr>
+      <p:sp>
+        <p:nvSpPr>
+          <p:cNvPr id="2" name="Title 1">
+            <a:extLst>
+              <a:ext uri="{FF2B5EF4-FFF2-40B4-BE49-F238E27FC236}">
+                <a16:creationId xmlns:a16="http://schemas.microsoft.com/office/drawing/2014/main" id="{D58A28C4-517E-44E4-9BD7-024C12BB4A4F}"/>
+              </a:ext>
+            </a:extLst>
+          </p:cNvPr>
+          <p:cNvSpPr>
+            <a:spLocks noGrp="1"/>
+          </p:cNvSpPr>
+          <p:nvPr>
+            <p:ph type="title"/>
+          </p:nvPr>
+        </p:nvSpPr>
+        <p:spPr/>
+        <p:txBody>
+          <a:bodyPr/>
+          <a:lstStyle/>
+          <a:p>
+            <a:r>
+              <a:rPr lang="de-CH" dirty="0"/>
+              <a:t>Learning Goals</a:t>
+            </a:r>
+            <a:endParaRPr lang="en-CH" dirty="0"/>
+          </a:p>
+        </p:txBody>
+      </p:sp>
+      <p:sp>
+        <p:nvSpPr>
+          <p:cNvPr id="3" name="Content Placeholder 2">
+            <a:extLst>
+              <a:ext uri="{FF2B5EF4-FFF2-40B4-BE49-F238E27FC236}">
+                <a16:creationId xmlns:a16="http://schemas.microsoft.com/office/drawing/2014/main" id="{20FB50C2-9865-4C24-8D48-F7BF0D6C2901}"/>
+              </a:ext>
+            </a:extLst>
+          </p:cNvPr>
+          <p:cNvSpPr>
+            <a:spLocks noGrp="1"/>
+          </p:cNvSpPr>
+          <p:nvPr>
+            <p:ph idx="1"/>
+          </p:nvPr>
+        </p:nvSpPr>
+        <p:spPr>
+          <a:xfrm>
+            <a:off x="838200" y="1690688"/>
+            <a:ext cx="10515600" cy="4486275"/>
+          </a:xfrm>
+        </p:spPr>
+        <p:txBody>
+          <a:bodyPr>
+            <a:normAutofit lnSpcReduction="10000"/>
+          </a:bodyPr>
+          <a:lstStyle/>
+          <a:p>
+            <a:pPr>
+              <a:buFont typeface="Wingdings" panose="05000000000000000000" pitchFamily="2" charset="2"/>
+              <a:buChar char="ü"/>
+            </a:pPr>
+            <a:r>
+              <a:rPr lang="de-CH" dirty="0"/>
+              <a:t> The </a:t>
+            </a:r>
+            <a:r>
+              <a:rPr lang="de-CH" dirty="0" err="1"/>
+              <a:t>student</a:t>
+            </a:r>
+            <a:r>
+              <a:rPr lang="de-CH" dirty="0"/>
+              <a:t> is </a:t>
+            </a:r>
+            <a:r>
+              <a:rPr lang="de-CH" dirty="0" err="1"/>
+              <a:t>able</a:t>
+            </a:r>
+            <a:r>
+              <a:rPr lang="de-CH" dirty="0"/>
+              <a:t> to </a:t>
+            </a:r>
+            <a:r>
+              <a:rPr lang="de-CH" dirty="0" err="1"/>
+              <a:t>explain</a:t>
+            </a:r>
+            <a:r>
+              <a:rPr lang="de-CH" dirty="0"/>
+              <a:t> what is a </a:t>
+            </a:r>
+            <a:r>
+              <a:rPr lang="de-CH" dirty="0" err="1"/>
+              <a:t>vector</a:t>
+            </a:r>
+            <a:r>
+              <a:rPr lang="de-CH" dirty="0"/>
+              <a:t> and a </a:t>
+            </a:r>
+            <a:r>
+              <a:rPr lang="de-CH" dirty="0" err="1"/>
+              <a:t>matrix</a:t>
+            </a:r>
+            <a:endParaRPr lang="de-CH" dirty="0"/>
+          </a:p>
+          <a:p>
+            <a:pPr>
+              <a:buFont typeface="Wingdings" panose="05000000000000000000" pitchFamily="2" charset="2"/>
+              <a:buChar char="ü"/>
+            </a:pPr>
+            <a:r>
+              <a:rPr lang="de-CH" dirty="0"/>
+              <a:t> The </a:t>
+            </a:r>
+            <a:r>
+              <a:rPr lang="de-CH" dirty="0" err="1"/>
+              <a:t>student</a:t>
+            </a:r>
+            <a:r>
+              <a:rPr lang="de-CH" dirty="0"/>
+              <a:t> is </a:t>
+            </a:r>
+            <a:r>
+              <a:rPr lang="de-CH" dirty="0" err="1"/>
+              <a:t>able</a:t>
+            </a:r>
+            <a:r>
+              <a:rPr lang="de-CH" dirty="0"/>
+              <a:t> to </a:t>
+            </a:r>
+            <a:r>
+              <a:rPr lang="de-CH" dirty="0" err="1"/>
+              <a:t>understand</a:t>
+            </a:r>
+            <a:r>
+              <a:rPr lang="de-CH" dirty="0"/>
+              <a:t> </a:t>
+            </a:r>
+            <a:r>
+              <a:rPr lang="de-CH" dirty="0" err="1"/>
+              <a:t>the</a:t>
+            </a:r>
+            <a:r>
+              <a:rPr lang="de-CH" dirty="0"/>
+              <a:t> </a:t>
+            </a:r>
+            <a:r>
+              <a:rPr lang="de-CH" dirty="0" err="1"/>
+              <a:t>main</a:t>
+            </a:r>
+            <a:r>
+              <a:rPr lang="de-CH" dirty="0"/>
+              <a:t> </a:t>
+            </a:r>
+            <a:r>
+              <a:rPr lang="de-CH" dirty="0" err="1"/>
+              <a:t>operations</a:t>
+            </a:r>
+            <a:r>
+              <a:rPr lang="de-CH" dirty="0"/>
+              <a:t> you </a:t>
+            </a:r>
+            <a:r>
+              <a:rPr lang="de-CH" dirty="0" err="1"/>
+              <a:t>can</a:t>
+            </a:r>
+            <a:r>
+              <a:rPr lang="de-CH" dirty="0"/>
+              <a:t> perform on a </a:t>
+            </a:r>
+            <a:r>
+              <a:rPr lang="de-CH" dirty="0" err="1"/>
+              <a:t>vector</a:t>
+            </a:r>
+            <a:r>
+              <a:rPr lang="de-CH" dirty="0"/>
+              <a:t> and a </a:t>
+            </a:r>
+            <a:r>
+              <a:rPr lang="de-CH" dirty="0" err="1"/>
+              <a:t>matrix</a:t>
+            </a:r>
+            <a:endParaRPr lang="de-CH" dirty="0"/>
+          </a:p>
+          <a:p>
+            <a:pPr>
+              <a:buFont typeface="Wingdings" panose="05000000000000000000" pitchFamily="2" charset="2"/>
+              <a:buChar char="q"/>
+            </a:pPr>
+            <a:r>
+              <a:rPr lang="de-CH" dirty="0"/>
+              <a:t> The </a:t>
+            </a:r>
+            <a:r>
+              <a:rPr lang="de-CH" dirty="0" err="1"/>
+              <a:t>student</a:t>
+            </a:r>
+            <a:r>
+              <a:rPr lang="de-CH" dirty="0"/>
+              <a:t> is </a:t>
+            </a:r>
+            <a:r>
+              <a:rPr lang="de-CH" dirty="0" err="1"/>
+              <a:t>able</a:t>
+            </a:r>
+            <a:r>
+              <a:rPr lang="de-CH" dirty="0"/>
+              <a:t> to </a:t>
+            </a:r>
+            <a:r>
+              <a:rPr lang="de-CH" dirty="0" err="1"/>
+              <a:t>implement</a:t>
+            </a:r>
+            <a:r>
+              <a:rPr lang="de-CH" dirty="0"/>
+              <a:t> </a:t>
+            </a:r>
+            <a:r>
+              <a:rPr lang="de-CH" dirty="0" err="1"/>
+              <a:t>the</a:t>
+            </a:r>
+            <a:r>
+              <a:rPr lang="de-CH" dirty="0"/>
+              <a:t> </a:t>
+            </a:r>
+            <a:r>
+              <a:rPr lang="de-CH" dirty="0" err="1"/>
+              <a:t>main</a:t>
+            </a:r>
+            <a:r>
+              <a:rPr lang="de-CH" dirty="0"/>
+              <a:t> </a:t>
+            </a:r>
+            <a:r>
+              <a:rPr lang="de-CH" dirty="0" err="1"/>
+              <a:t>operations</a:t>
+            </a:r>
+            <a:r>
+              <a:rPr lang="de-CH" dirty="0"/>
+              <a:t> in </a:t>
+            </a:r>
+            <a:r>
+              <a:rPr lang="de-CH" dirty="0" err="1"/>
+              <a:t>basic</a:t>
+            </a:r>
+            <a:r>
+              <a:rPr lang="de-CH" dirty="0"/>
+              <a:t> Python</a:t>
+            </a:r>
+          </a:p>
+          <a:p>
+            <a:pPr>
+              <a:buFont typeface="Wingdings" panose="05000000000000000000" pitchFamily="2" charset="2"/>
+              <a:buChar char="q"/>
+            </a:pPr>
+            <a:r>
+              <a:rPr lang="de-CH" dirty="0"/>
+              <a:t> The </a:t>
+            </a:r>
+            <a:r>
+              <a:rPr lang="de-CH" dirty="0" err="1"/>
+              <a:t>student</a:t>
+            </a:r>
+            <a:r>
+              <a:rPr lang="de-CH" dirty="0"/>
+              <a:t> is </a:t>
+            </a:r>
+            <a:r>
+              <a:rPr lang="de-CH" dirty="0" err="1"/>
+              <a:t>able</a:t>
+            </a:r>
+            <a:r>
+              <a:rPr lang="de-CH" dirty="0"/>
+              <a:t> to </a:t>
+            </a:r>
+            <a:r>
+              <a:rPr lang="de-CH" dirty="0" err="1"/>
+              <a:t>implement</a:t>
+            </a:r>
+            <a:r>
+              <a:rPr lang="de-CH" dirty="0"/>
+              <a:t> </a:t>
+            </a:r>
+            <a:r>
+              <a:rPr lang="de-CH" dirty="0" err="1"/>
+              <a:t>the</a:t>
+            </a:r>
+            <a:r>
+              <a:rPr lang="de-CH" dirty="0"/>
+              <a:t> </a:t>
+            </a:r>
+            <a:r>
+              <a:rPr lang="de-CH" dirty="0" err="1"/>
+              <a:t>main</a:t>
+            </a:r>
+            <a:r>
+              <a:rPr lang="de-CH" dirty="0"/>
+              <a:t> </a:t>
+            </a:r>
+            <a:r>
+              <a:rPr lang="de-CH" dirty="0" err="1"/>
+              <a:t>operations</a:t>
+            </a:r>
+            <a:r>
+              <a:rPr lang="de-CH" dirty="0"/>
+              <a:t> in numpy</a:t>
+            </a:r>
+          </a:p>
+          <a:p>
+            <a:pPr>
+              <a:buFont typeface="Wingdings" panose="05000000000000000000" pitchFamily="2" charset="2"/>
+              <a:buChar char="q"/>
+            </a:pPr>
+            <a:r>
+              <a:rPr lang="de-CH" dirty="0"/>
+              <a:t> The </a:t>
+            </a:r>
+            <a:r>
+              <a:rPr lang="de-CH" dirty="0" err="1"/>
+              <a:t>student</a:t>
+            </a:r>
+            <a:r>
+              <a:rPr lang="de-CH" dirty="0"/>
+              <a:t> is </a:t>
+            </a:r>
+            <a:r>
+              <a:rPr lang="de-CH" dirty="0" err="1"/>
+              <a:t>able</a:t>
+            </a:r>
+            <a:r>
+              <a:rPr lang="de-CH" dirty="0"/>
+              <a:t> to </a:t>
+            </a:r>
+            <a:r>
+              <a:rPr lang="de-CH" dirty="0" err="1"/>
+              <a:t>understand</a:t>
+            </a:r>
+            <a:r>
+              <a:rPr lang="de-CH" dirty="0"/>
+              <a:t> </a:t>
+            </a:r>
+            <a:r>
+              <a:rPr lang="de-CH" dirty="0" err="1"/>
+              <a:t>the</a:t>
+            </a:r>
+            <a:r>
+              <a:rPr lang="de-CH" dirty="0"/>
+              <a:t> </a:t>
+            </a:r>
+            <a:r>
+              <a:rPr lang="de-CH" dirty="0" err="1"/>
+              <a:t>difference</a:t>
+            </a:r>
+            <a:r>
+              <a:rPr lang="de-CH" dirty="0"/>
+              <a:t> in how numpy </a:t>
+            </a:r>
+            <a:r>
+              <a:rPr lang="de-CH" dirty="0" err="1"/>
+              <a:t>operates</a:t>
+            </a:r>
+            <a:r>
+              <a:rPr lang="de-CH" dirty="0"/>
+              <a:t> on </a:t>
+            </a:r>
+            <a:r>
+              <a:rPr lang="de-CH" dirty="0" err="1"/>
+              <a:t>arrays</a:t>
+            </a:r>
+            <a:endParaRPr lang="de-CH" dirty="0"/>
+          </a:p>
+          <a:p>
+            <a:pPr>
+              <a:buFont typeface="Wingdings" panose="05000000000000000000" pitchFamily="2" charset="2"/>
+              <a:buChar char="q"/>
+            </a:pPr>
+            <a:r>
+              <a:rPr lang="de-CH" dirty="0"/>
+              <a:t> The </a:t>
+            </a:r>
+            <a:r>
+              <a:rPr lang="de-CH" dirty="0" err="1"/>
+              <a:t>student</a:t>
+            </a:r>
+            <a:r>
+              <a:rPr lang="de-CH" dirty="0"/>
+              <a:t> is </a:t>
+            </a:r>
+            <a:r>
+              <a:rPr lang="de-CH" dirty="0" err="1"/>
+              <a:t>able</a:t>
+            </a:r>
+            <a:r>
+              <a:rPr lang="de-CH" dirty="0"/>
+              <a:t> to </a:t>
+            </a:r>
+            <a:r>
+              <a:rPr lang="de-CH" dirty="0" err="1"/>
+              <a:t>use</a:t>
+            </a:r>
+            <a:r>
+              <a:rPr lang="de-CH" dirty="0"/>
+              <a:t> </a:t>
+            </a:r>
+            <a:r>
+              <a:rPr lang="de-CH" dirty="0" err="1"/>
+              <a:t>the</a:t>
+            </a:r>
+            <a:r>
+              <a:rPr lang="de-CH" dirty="0"/>
+              <a:t> </a:t>
+            </a:r>
+            <a:r>
+              <a:rPr lang="de-CH" dirty="0" err="1"/>
+              <a:t>concepts</a:t>
+            </a:r>
+            <a:r>
+              <a:rPr lang="de-CH" dirty="0"/>
+              <a:t> to </a:t>
+            </a:r>
+            <a:r>
+              <a:rPr lang="de-CH" dirty="0" err="1"/>
+              <a:t>implement</a:t>
+            </a:r>
+            <a:r>
+              <a:rPr lang="de-CH" dirty="0"/>
+              <a:t> a </a:t>
+            </a:r>
+            <a:r>
+              <a:rPr lang="de-CH" dirty="0" err="1"/>
+              <a:t>complete</a:t>
+            </a:r>
+            <a:r>
+              <a:rPr lang="de-CH" dirty="0"/>
+              <a:t> linear </a:t>
+            </a:r>
+            <a:r>
+              <a:rPr lang="de-CH" dirty="0" err="1"/>
+              <a:t>regression</a:t>
+            </a:r>
+            <a:r>
+              <a:rPr lang="de-CH" dirty="0"/>
+              <a:t> </a:t>
+            </a:r>
+            <a:r>
+              <a:rPr lang="de-CH" dirty="0" err="1"/>
+              <a:t>model</a:t>
+            </a:r>
+            <a:r>
+              <a:rPr lang="de-CH" dirty="0"/>
+              <a:t> from </a:t>
+            </a:r>
+            <a:r>
+              <a:rPr lang="de-CH" dirty="0" err="1"/>
+              <a:t>scratch</a:t>
+            </a:r>
+            <a:endParaRPr lang="de-CH" dirty="0"/>
+          </a:p>
+          <a:p>
+            <a:pPr marL="0" indent="0">
+              <a:buNone/>
+            </a:pPr>
+            <a:endParaRPr lang="en-CH" dirty="0"/>
+          </a:p>
+        </p:txBody>
+      </p:sp>
+    </p:spTree>
+    <p:extLst>
+      <p:ext uri="{BB962C8B-B14F-4D97-AF65-F5344CB8AC3E}">
+        <p14:creationId xmlns:p14="http://schemas.microsoft.com/office/powerpoint/2010/main" val="3761192873"/>
+      </p:ext>
+    </p:extLst>
+  </p:cSld>
+  <p:clrMapOvr>
+    <a:masterClrMapping/>
+  </p:clrMapOvr>
+</p:sld>
+</file>
+
+<file path=ppt/slides/slide6.xml><?xml version="1.0" encoding="utf-8"?>
+<p:sld xmlns:a="http://schemas.openxmlformats.org/drawingml/2006/main" xmlns:r="http://schemas.openxmlformats.org/officeDocument/2006/relationships" xmlns:p="http://schemas.openxmlformats.org/presentationml/2006/main">
+  <p:cSld>
+    <p:spTree>
+      <p:nvGrpSpPr>
+        <p:cNvPr id="1" name=""/>
+        <p:cNvGrpSpPr/>
+        <p:nvPr/>
+      </p:nvGrpSpPr>
+      <p:grpSpPr>
+        <a:xfrm>
+          <a:off x="0" y="0"/>
+          <a:ext cx="0" cy="0"/>
+          <a:chOff x="0" y="0"/>
+          <a:chExt cx="0" cy="0"/>
+        </a:xfrm>
+      </p:grpSpPr>
+      <p:sp>
+        <p:nvSpPr>
+          <p:cNvPr id="2" name="Title 1">
+            <a:extLst>
+              <a:ext uri="{FF2B5EF4-FFF2-40B4-BE49-F238E27FC236}">
+                <a16:creationId xmlns:a16="http://schemas.microsoft.com/office/drawing/2014/main" id="{D58A28C4-517E-44E4-9BD7-024C12BB4A4F}"/>
+              </a:ext>
+            </a:extLst>
+          </p:cNvPr>
+          <p:cNvSpPr>
+            <a:spLocks noGrp="1"/>
+          </p:cNvSpPr>
+          <p:nvPr>
+            <p:ph type="title"/>
+          </p:nvPr>
+        </p:nvSpPr>
+        <p:spPr/>
+        <p:txBody>
+          <a:bodyPr/>
+          <a:lstStyle/>
+          <a:p>
+            <a:r>
+              <a:rPr lang="de-CH" dirty="0"/>
+              <a:t>Learning Goals</a:t>
+            </a:r>
+            <a:endParaRPr lang="en-CH" dirty="0"/>
+          </a:p>
+        </p:txBody>
+      </p:sp>
+      <p:sp>
+        <p:nvSpPr>
+          <p:cNvPr id="3" name="Content Placeholder 2">
+            <a:extLst>
+              <a:ext uri="{FF2B5EF4-FFF2-40B4-BE49-F238E27FC236}">
+                <a16:creationId xmlns:a16="http://schemas.microsoft.com/office/drawing/2014/main" id="{20FB50C2-9865-4C24-8D48-F7BF0D6C2901}"/>
+              </a:ext>
+            </a:extLst>
+          </p:cNvPr>
+          <p:cNvSpPr>
+            <a:spLocks noGrp="1"/>
+          </p:cNvSpPr>
+          <p:nvPr>
+            <p:ph idx="1"/>
+          </p:nvPr>
+        </p:nvSpPr>
+        <p:spPr>
+          <a:xfrm>
+            <a:off x="838200" y="1690688"/>
+            <a:ext cx="10515600" cy="4486275"/>
+          </a:xfrm>
+        </p:spPr>
+        <p:txBody>
+          <a:bodyPr>
+            <a:normAutofit lnSpcReduction="10000"/>
+          </a:bodyPr>
+          <a:lstStyle/>
+          <a:p>
+            <a:pPr>
+              <a:buFont typeface="Wingdings" panose="05000000000000000000" pitchFamily="2" charset="2"/>
+              <a:buChar char="ü"/>
+            </a:pPr>
+            <a:r>
+              <a:rPr lang="de-CH" dirty="0"/>
+              <a:t> The </a:t>
+            </a:r>
+            <a:r>
+              <a:rPr lang="de-CH" dirty="0" err="1"/>
+              <a:t>student</a:t>
+            </a:r>
+            <a:r>
+              <a:rPr lang="de-CH" dirty="0"/>
+              <a:t> is </a:t>
+            </a:r>
+            <a:r>
+              <a:rPr lang="de-CH" dirty="0" err="1"/>
+              <a:t>able</a:t>
+            </a:r>
+            <a:r>
+              <a:rPr lang="de-CH" dirty="0"/>
+              <a:t> to </a:t>
+            </a:r>
+            <a:r>
+              <a:rPr lang="de-CH" dirty="0" err="1"/>
+              <a:t>explain</a:t>
+            </a:r>
+            <a:r>
+              <a:rPr lang="de-CH" dirty="0"/>
+              <a:t> what is a </a:t>
+            </a:r>
+            <a:r>
+              <a:rPr lang="de-CH" dirty="0" err="1"/>
+              <a:t>vector</a:t>
+            </a:r>
+            <a:r>
+              <a:rPr lang="de-CH" dirty="0"/>
+              <a:t> and a </a:t>
+            </a:r>
+            <a:r>
+              <a:rPr lang="de-CH" dirty="0" err="1"/>
+              <a:t>matrix</a:t>
+            </a:r>
+            <a:endParaRPr lang="de-CH" dirty="0"/>
+          </a:p>
+          <a:p>
+            <a:pPr>
+              <a:buFont typeface="Wingdings" panose="05000000000000000000" pitchFamily="2" charset="2"/>
+              <a:buChar char="ü"/>
+            </a:pPr>
+            <a:r>
+              <a:rPr lang="de-CH" dirty="0"/>
+              <a:t> The </a:t>
+            </a:r>
+            <a:r>
+              <a:rPr lang="de-CH" dirty="0" err="1"/>
+              <a:t>student</a:t>
+            </a:r>
+            <a:r>
+              <a:rPr lang="de-CH" dirty="0"/>
+              <a:t> is </a:t>
+            </a:r>
+            <a:r>
+              <a:rPr lang="de-CH" dirty="0" err="1"/>
+              <a:t>able</a:t>
+            </a:r>
+            <a:r>
+              <a:rPr lang="de-CH" dirty="0"/>
+              <a:t> to </a:t>
+            </a:r>
+            <a:r>
+              <a:rPr lang="de-CH" dirty="0" err="1"/>
+              <a:t>understand</a:t>
+            </a:r>
+            <a:r>
+              <a:rPr lang="de-CH" dirty="0"/>
+              <a:t> </a:t>
+            </a:r>
+            <a:r>
+              <a:rPr lang="de-CH" dirty="0" err="1"/>
+              <a:t>the</a:t>
+            </a:r>
+            <a:r>
+              <a:rPr lang="de-CH" dirty="0"/>
+              <a:t> </a:t>
+            </a:r>
+            <a:r>
+              <a:rPr lang="de-CH" dirty="0" err="1"/>
+              <a:t>main</a:t>
+            </a:r>
+            <a:r>
+              <a:rPr lang="de-CH" dirty="0"/>
+              <a:t> </a:t>
+            </a:r>
+            <a:r>
+              <a:rPr lang="de-CH" dirty="0" err="1"/>
+              <a:t>operations</a:t>
+            </a:r>
+            <a:r>
+              <a:rPr lang="de-CH" dirty="0"/>
+              <a:t> you </a:t>
+            </a:r>
+            <a:r>
+              <a:rPr lang="de-CH" dirty="0" err="1"/>
+              <a:t>can</a:t>
+            </a:r>
+            <a:r>
+              <a:rPr lang="de-CH" dirty="0"/>
+              <a:t> perform on a </a:t>
+            </a:r>
+            <a:r>
+              <a:rPr lang="de-CH" dirty="0" err="1"/>
+              <a:t>vector</a:t>
+            </a:r>
+            <a:r>
+              <a:rPr lang="de-CH" dirty="0"/>
+              <a:t> and a </a:t>
+            </a:r>
+            <a:r>
+              <a:rPr lang="de-CH" dirty="0" err="1"/>
+              <a:t>matrix</a:t>
+            </a:r>
+            <a:endParaRPr lang="de-CH" dirty="0"/>
+          </a:p>
+          <a:p>
+            <a:pPr>
+              <a:buFont typeface="Wingdings" panose="05000000000000000000" pitchFamily="2" charset="2"/>
+              <a:buChar char="ü"/>
+            </a:pPr>
+            <a:r>
+              <a:rPr lang="de-CH" dirty="0"/>
+              <a:t> The </a:t>
+            </a:r>
+            <a:r>
+              <a:rPr lang="de-CH" dirty="0" err="1"/>
+              <a:t>student</a:t>
+            </a:r>
+            <a:r>
+              <a:rPr lang="de-CH" dirty="0"/>
+              <a:t> is </a:t>
+            </a:r>
+            <a:r>
+              <a:rPr lang="de-CH" dirty="0" err="1"/>
+              <a:t>able</a:t>
+            </a:r>
+            <a:r>
+              <a:rPr lang="de-CH" dirty="0"/>
+              <a:t> to </a:t>
+            </a:r>
+            <a:r>
+              <a:rPr lang="de-CH" dirty="0" err="1"/>
+              <a:t>implement</a:t>
+            </a:r>
+            <a:r>
+              <a:rPr lang="de-CH" dirty="0"/>
+              <a:t> </a:t>
+            </a:r>
+            <a:r>
+              <a:rPr lang="de-CH" dirty="0" err="1"/>
+              <a:t>the</a:t>
+            </a:r>
+            <a:r>
+              <a:rPr lang="de-CH" dirty="0"/>
+              <a:t> </a:t>
+            </a:r>
+            <a:r>
+              <a:rPr lang="de-CH" dirty="0" err="1"/>
+              <a:t>main</a:t>
+            </a:r>
+            <a:r>
+              <a:rPr lang="de-CH" dirty="0"/>
+              <a:t> </a:t>
+            </a:r>
+            <a:r>
+              <a:rPr lang="de-CH" dirty="0" err="1"/>
+              <a:t>operations</a:t>
+            </a:r>
+            <a:r>
+              <a:rPr lang="de-CH" dirty="0"/>
+              <a:t> in </a:t>
+            </a:r>
+            <a:r>
+              <a:rPr lang="de-CH" dirty="0" err="1"/>
+              <a:t>basic</a:t>
+            </a:r>
+            <a:r>
+              <a:rPr lang="de-CH" dirty="0"/>
+              <a:t> Python</a:t>
+            </a:r>
+          </a:p>
+          <a:p>
+            <a:pPr>
+              <a:buFont typeface="Wingdings" panose="05000000000000000000" pitchFamily="2" charset="2"/>
+              <a:buChar char="q"/>
+            </a:pPr>
+            <a:r>
+              <a:rPr lang="de-CH" dirty="0"/>
+              <a:t> The </a:t>
+            </a:r>
+            <a:r>
+              <a:rPr lang="de-CH" dirty="0" err="1"/>
+              <a:t>student</a:t>
+            </a:r>
+            <a:r>
+              <a:rPr lang="de-CH" dirty="0"/>
+              <a:t> is </a:t>
+            </a:r>
+            <a:r>
+              <a:rPr lang="de-CH" dirty="0" err="1"/>
+              <a:t>able</a:t>
+            </a:r>
+            <a:r>
+              <a:rPr lang="de-CH" dirty="0"/>
+              <a:t> to </a:t>
+            </a:r>
+            <a:r>
+              <a:rPr lang="de-CH" dirty="0" err="1"/>
+              <a:t>implement</a:t>
+            </a:r>
+            <a:r>
+              <a:rPr lang="de-CH" dirty="0"/>
+              <a:t> </a:t>
+            </a:r>
+            <a:r>
+              <a:rPr lang="de-CH" dirty="0" err="1"/>
+              <a:t>the</a:t>
+            </a:r>
+            <a:r>
+              <a:rPr lang="de-CH" dirty="0"/>
+              <a:t> </a:t>
+            </a:r>
+            <a:r>
+              <a:rPr lang="de-CH" dirty="0" err="1"/>
+              <a:t>main</a:t>
+            </a:r>
+            <a:r>
+              <a:rPr lang="de-CH" dirty="0"/>
+              <a:t> </a:t>
+            </a:r>
+            <a:r>
+              <a:rPr lang="de-CH" dirty="0" err="1"/>
+              <a:t>operations</a:t>
+            </a:r>
+            <a:r>
+              <a:rPr lang="de-CH" dirty="0"/>
+              <a:t> in numpy</a:t>
+            </a:r>
+          </a:p>
+          <a:p>
+            <a:pPr>
+              <a:buFont typeface="Wingdings" panose="05000000000000000000" pitchFamily="2" charset="2"/>
+              <a:buChar char="q"/>
+            </a:pPr>
+            <a:r>
+              <a:rPr lang="de-CH" dirty="0"/>
+              <a:t> The </a:t>
+            </a:r>
+            <a:r>
+              <a:rPr lang="de-CH" dirty="0" err="1"/>
+              <a:t>student</a:t>
+            </a:r>
+            <a:r>
+              <a:rPr lang="de-CH" dirty="0"/>
+              <a:t> is </a:t>
+            </a:r>
+            <a:r>
+              <a:rPr lang="de-CH" dirty="0" err="1"/>
+              <a:t>able</a:t>
+            </a:r>
+            <a:r>
+              <a:rPr lang="de-CH" dirty="0"/>
+              <a:t> to </a:t>
+            </a:r>
+            <a:r>
+              <a:rPr lang="de-CH" dirty="0" err="1"/>
+              <a:t>understand</a:t>
+            </a:r>
+            <a:r>
+              <a:rPr lang="de-CH" dirty="0"/>
+              <a:t> </a:t>
+            </a:r>
+            <a:r>
+              <a:rPr lang="de-CH" dirty="0" err="1"/>
+              <a:t>the</a:t>
+            </a:r>
+            <a:r>
+              <a:rPr lang="de-CH" dirty="0"/>
+              <a:t> </a:t>
+            </a:r>
+            <a:r>
+              <a:rPr lang="de-CH" dirty="0" err="1"/>
+              <a:t>difference</a:t>
+            </a:r>
+            <a:r>
+              <a:rPr lang="de-CH" dirty="0"/>
+              <a:t> in how numpy </a:t>
+            </a:r>
+            <a:r>
+              <a:rPr lang="de-CH" dirty="0" err="1"/>
+              <a:t>operates</a:t>
+            </a:r>
+            <a:r>
+              <a:rPr lang="de-CH" dirty="0"/>
+              <a:t> on </a:t>
+            </a:r>
+            <a:r>
+              <a:rPr lang="de-CH" dirty="0" err="1"/>
+              <a:t>arrays</a:t>
+            </a:r>
+            <a:endParaRPr lang="de-CH" dirty="0"/>
+          </a:p>
+          <a:p>
+            <a:pPr>
+              <a:buFont typeface="Wingdings" panose="05000000000000000000" pitchFamily="2" charset="2"/>
+              <a:buChar char="q"/>
+            </a:pPr>
+            <a:r>
+              <a:rPr lang="de-CH" dirty="0"/>
+              <a:t> The </a:t>
+            </a:r>
+            <a:r>
+              <a:rPr lang="de-CH" dirty="0" err="1"/>
+              <a:t>student</a:t>
+            </a:r>
+            <a:r>
+              <a:rPr lang="de-CH" dirty="0"/>
+              <a:t> is </a:t>
+            </a:r>
+            <a:r>
+              <a:rPr lang="de-CH" dirty="0" err="1"/>
+              <a:t>able</a:t>
+            </a:r>
+            <a:r>
+              <a:rPr lang="de-CH" dirty="0"/>
+              <a:t> to </a:t>
+            </a:r>
+            <a:r>
+              <a:rPr lang="de-CH" dirty="0" err="1"/>
+              <a:t>use</a:t>
+            </a:r>
+            <a:r>
+              <a:rPr lang="de-CH" dirty="0"/>
+              <a:t> </a:t>
+            </a:r>
+            <a:r>
+              <a:rPr lang="de-CH" dirty="0" err="1"/>
+              <a:t>the</a:t>
+            </a:r>
+            <a:r>
+              <a:rPr lang="de-CH" dirty="0"/>
+              <a:t> </a:t>
+            </a:r>
+            <a:r>
+              <a:rPr lang="de-CH" dirty="0" err="1"/>
+              <a:t>concepts</a:t>
+            </a:r>
+            <a:r>
+              <a:rPr lang="de-CH" dirty="0"/>
+              <a:t> to </a:t>
+            </a:r>
+            <a:r>
+              <a:rPr lang="de-CH" dirty="0" err="1"/>
+              <a:t>implement</a:t>
+            </a:r>
+            <a:r>
+              <a:rPr lang="de-CH" dirty="0"/>
+              <a:t> a </a:t>
+            </a:r>
+            <a:r>
+              <a:rPr lang="de-CH" dirty="0" err="1"/>
+              <a:t>complete</a:t>
+            </a:r>
+            <a:r>
+              <a:rPr lang="de-CH" dirty="0"/>
+              <a:t> linear </a:t>
+            </a:r>
+            <a:r>
+              <a:rPr lang="de-CH" dirty="0" err="1"/>
+              <a:t>regression</a:t>
+            </a:r>
+            <a:r>
+              <a:rPr lang="de-CH" dirty="0"/>
+              <a:t> </a:t>
+            </a:r>
+            <a:r>
+              <a:rPr lang="de-CH" dirty="0" err="1"/>
+              <a:t>model</a:t>
+            </a:r>
+            <a:r>
+              <a:rPr lang="de-CH" dirty="0"/>
+              <a:t> from </a:t>
+            </a:r>
+            <a:r>
+              <a:rPr lang="de-CH" dirty="0" err="1"/>
+              <a:t>scratch</a:t>
+            </a:r>
+            <a:endParaRPr lang="de-CH" dirty="0"/>
+          </a:p>
+          <a:p>
+            <a:pPr marL="0" indent="0">
+              <a:buNone/>
+            </a:pPr>
+            <a:endParaRPr lang="en-CH" dirty="0"/>
+          </a:p>
+        </p:txBody>
+      </p:sp>
+    </p:spTree>
+    <p:extLst>
+      <p:ext uri="{BB962C8B-B14F-4D97-AF65-F5344CB8AC3E}">
+        <p14:creationId xmlns:p14="http://schemas.microsoft.com/office/powerpoint/2010/main" val="3463734279"/>
+      </p:ext>
+    </p:extLst>
+  </p:cSld>
+  <p:clrMapOvr>
+    <a:masterClrMapping/>
+  </p:clrMapOvr>
+</p:sld>
+</file>
+
+<file path=ppt/slides/slide7.xml><?xml version="1.0" encoding="utf-8"?>
+<p:sld xmlns:a="http://schemas.openxmlformats.org/drawingml/2006/main" xmlns:r="http://schemas.openxmlformats.org/officeDocument/2006/relationships" xmlns:p="http://schemas.openxmlformats.org/presentationml/2006/main">
+  <p:cSld>
+    <p:spTree>
+      <p:nvGrpSpPr>
+        <p:cNvPr id="1" name=""/>
+        <p:cNvGrpSpPr/>
+        <p:nvPr/>
+      </p:nvGrpSpPr>
+      <p:grpSpPr>
+        <a:xfrm>
+          <a:off x="0" y="0"/>
+          <a:ext cx="0" cy="0"/>
+          <a:chOff x="0" y="0"/>
+          <a:chExt cx="0" cy="0"/>
+        </a:xfrm>
+      </p:grpSpPr>
+      <p:sp>
+        <p:nvSpPr>
+          <p:cNvPr id="2" name="Title 1">
+            <a:extLst>
+              <a:ext uri="{FF2B5EF4-FFF2-40B4-BE49-F238E27FC236}">
+                <a16:creationId xmlns:a16="http://schemas.microsoft.com/office/drawing/2014/main" id="{D58A28C4-517E-44E4-9BD7-024C12BB4A4F}"/>
+              </a:ext>
+            </a:extLst>
+          </p:cNvPr>
+          <p:cNvSpPr>
+            <a:spLocks noGrp="1"/>
+          </p:cNvSpPr>
+          <p:nvPr>
+            <p:ph type="title"/>
+          </p:nvPr>
+        </p:nvSpPr>
+        <p:spPr/>
+        <p:txBody>
+          <a:bodyPr/>
+          <a:lstStyle/>
+          <a:p>
+            <a:r>
+              <a:rPr lang="de-CH" dirty="0"/>
+              <a:t>Learning Goals</a:t>
+            </a:r>
+            <a:endParaRPr lang="en-CH" dirty="0"/>
+          </a:p>
+        </p:txBody>
+      </p:sp>
+      <p:sp>
+        <p:nvSpPr>
+          <p:cNvPr id="3" name="Content Placeholder 2">
+            <a:extLst>
+              <a:ext uri="{FF2B5EF4-FFF2-40B4-BE49-F238E27FC236}">
+                <a16:creationId xmlns:a16="http://schemas.microsoft.com/office/drawing/2014/main" id="{20FB50C2-9865-4C24-8D48-F7BF0D6C2901}"/>
+              </a:ext>
+            </a:extLst>
+          </p:cNvPr>
+          <p:cNvSpPr>
+            <a:spLocks noGrp="1"/>
+          </p:cNvSpPr>
+          <p:nvPr>
+            <p:ph idx="1"/>
+          </p:nvPr>
+        </p:nvSpPr>
+        <p:spPr>
+          <a:xfrm>
+            <a:off x="838200" y="1690688"/>
+            <a:ext cx="10515600" cy="4486275"/>
+          </a:xfrm>
+        </p:spPr>
+        <p:txBody>
+          <a:bodyPr>
+            <a:normAutofit lnSpcReduction="10000"/>
+          </a:bodyPr>
+          <a:lstStyle/>
+          <a:p>
+            <a:pPr>
+              <a:buFont typeface="Wingdings" panose="05000000000000000000" pitchFamily="2" charset="2"/>
+              <a:buChar char="ü"/>
+            </a:pPr>
+            <a:r>
+              <a:rPr lang="de-CH" dirty="0"/>
+              <a:t> The </a:t>
+            </a:r>
+            <a:r>
+              <a:rPr lang="de-CH" dirty="0" err="1"/>
+              <a:t>student</a:t>
+            </a:r>
+            <a:r>
+              <a:rPr lang="de-CH" dirty="0"/>
+              <a:t> is </a:t>
+            </a:r>
+            <a:r>
+              <a:rPr lang="de-CH" dirty="0" err="1"/>
+              <a:t>able</a:t>
+            </a:r>
+            <a:r>
+              <a:rPr lang="de-CH" dirty="0"/>
+              <a:t> to </a:t>
+            </a:r>
+            <a:r>
+              <a:rPr lang="de-CH" dirty="0" err="1"/>
+              <a:t>explain</a:t>
+            </a:r>
+            <a:r>
+              <a:rPr lang="de-CH" dirty="0"/>
+              <a:t> what is a </a:t>
+            </a:r>
+            <a:r>
+              <a:rPr lang="de-CH" dirty="0" err="1"/>
+              <a:t>vector</a:t>
+            </a:r>
+            <a:r>
+              <a:rPr lang="de-CH" dirty="0"/>
+              <a:t> and a </a:t>
+            </a:r>
+            <a:r>
+              <a:rPr lang="de-CH" dirty="0" err="1"/>
+              <a:t>matrix</a:t>
+            </a:r>
+            <a:endParaRPr lang="de-CH" dirty="0"/>
+          </a:p>
+          <a:p>
+            <a:pPr>
+              <a:buFont typeface="Wingdings" panose="05000000000000000000" pitchFamily="2" charset="2"/>
+              <a:buChar char="ü"/>
+            </a:pPr>
+            <a:r>
+              <a:rPr lang="de-CH" dirty="0"/>
+              <a:t> The </a:t>
+            </a:r>
+            <a:r>
+              <a:rPr lang="de-CH" dirty="0" err="1"/>
+              <a:t>student</a:t>
+            </a:r>
+            <a:r>
+              <a:rPr lang="de-CH" dirty="0"/>
+              <a:t> is </a:t>
+            </a:r>
+            <a:r>
+              <a:rPr lang="de-CH" dirty="0" err="1"/>
+              <a:t>able</a:t>
+            </a:r>
+            <a:r>
+              <a:rPr lang="de-CH" dirty="0"/>
+              <a:t> to </a:t>
+            </a:r>
+            <a:r>
+              <a:rPr lang="de-CH" dirty="0" err="1"/>
+              <a:t>understand</a:t>
+            </a:r>
+            <a:r>
+              <a:rPr lang="de-CH" dirty="0"/>
+              <a:t> </a:t>
+            </a:r>
+            <a:r>
+              <a:rPr lang="de-CH" dirty="0" err="1"/>
+              <a:t>the</a:t>
+            </a:r>
+            <a:r>
+              <a:rPr lang="de-CH" dirty="0"/>
+              <a:t> </a:t>
+            </a:r>
+            <a:r>
+              <a:rPr lang="de-CH" dirty="0" err="1"/>
+              <a:t>main</a:t>
+            </a:r>
+            <a:r>
+              <a:rPr lang="de-CH" dirty="0"/>
+              <a:t> </a:t>
+            </a:r>
+            <a:r>
+              <a:rPr lang="de-CH" dirty="0" err="1"/>
+              <a:t>operations</a:t>
+            </a:r>
+            <a:r>
+              <a:rPr lang="de-CH" dirty="0"/>
+              <a:t> you </a:t>
+            </a:r>
+            <a:r>
+              <a:rPr lang="de-CH" dirty="0" err="1"/>
+              <a:t>can</a:t>
+            </a:r>
+            <a:r>
+              <a:rPr lang="de-CH" dirty="0"/>
+              <a:t> perform on a </a:t>
+            </a:r>
+            <a:r>
+              <a:rPr lang="de-CH" dirty="0" err="1"/>
+              <a:t>vector</a:t>
+            </a:r>
+            <a:r>
+              <a:rPr lang="de-CH" dirty="0"/>
+              <a:t> and a </a:t>
+            </a:r>
+            <a:r>
+              <a:rPr lang="de-CH" dirty="0" err="1"/>
+              <a:t>matrix</a:t>
+            </a:r>
+            <a:endParaRPr lang="de-CH" dirty="0"/>
+          </a:p>
+          <a:p>
+            <a:pPr>
+              <a:buFont typeface="Wingdings" panose="05000000000000000000" pitchFamily="2" charset="2"/>
+              <a:buChar char="ü"/>
+            </a:pPr>
+            <a:r>
+              <a:rPr lang="de-CH" dirty="0"/>
+              <a:t> The </a:t>
+            </a:r>
+            <a:r>
+              <a:rPr lang="de-CH" dirty="0" err="1"/>
+              <a:t>student</a:t>
+            </a:r>
+            <a:r>
+              <a:rPr lang="de-CH" dirty="0"/>
+              <a:t> is </a:t>
+            </a:r>
+            <a:r>
+              <a:rPr lang="de-CH" dirty="0" err="1"/>
+              <a:t>able</a:t>
+            </a:r>
+            <a:r>
+              <a:rPr lang="de-CH" dirty="0"/>
+              <a:t> to </a:t>
+            </a:r>
+            <a:r>
+              <a:rPr lang="de-CH" dirty="0" err="1"/>
+              <a:t>implement</a:t>
+            </a:r>
+            <a:r>
+              <a:rPr lang="de-CH" dirty="0"/>
+              <a:t> </a:t>
+            </a:r>
+            <a:r>
+              <a:rPr lang="de-CH" dirty="0" err="1"/>
+              <a:t>the</a:t>
+            </a:r>
+            <a:r>
+              <a:rPr lang="de-CH" dirty="0"/>
+              <a:t> </a:t>
+            </a:r>
+            <a:r>
+              <a:rPr lang="de-CH" dirty="0" err="1"/>
+              <a:t>main</a:t>
+            </a:r>
+            <a:r>
+              <a:rPr lang="de-CH" dirty="0"/>
+              <a:t> </a:t>
+            </a:r>
+            <a:r>
+              <a:rPr lang="de-CH" dirty="0" err="1"/>
+              <a:t>operations</a:t>
+            </a:r>
+            <a:r>
+              <a:rPr lang="de-CH" dirty="0"/>
+              <a:t> in </a:t>
+            </a:r>
+            <a:r>
+              <a:rPr lang="de-CH" dirty="0" err="1"/>
+              <a:t>basic</a:t>
+            </a:r>
+            <a:r>
+              <a:rPr lang="de-CH" dirty="0"/>
+              <a:t> Python</a:t>
+            </a:r>
+          </a:p>
+          <a:p>
+            <a:pPr>
+              <a:buFont typeface="Wingdings" panose="05000000000000000000" pitchFamily="2" charset="2"/>
+              <a:buChar char="ü"/>
+            </a:pPr>
+            <a:r>
+              <a:rPr lang="de-CH" dirty="0"/>
+              <a:t> The </a:t>
+            </a:r>
+            <a:r>
+              <a:rPr lang="de-CH" dirty="0" err="1"/>
+              <a:t>student</a:t>
+            </a:r>
+            <a:r>
+              <a:rPr lang="de-CH" dirty="0"/>
+              <a:t> is </a:t>
+            </a:r>
+            <a:r>
+              <a:rPr lang="de-CH" dirty="0" err="1"/>
+              <a:t>able</a:t>
+            </a:r>
+            <a:r>
+              <a:rPr lang="de-CH" dirty="0"/>
+              <a:t> to </a:t>
+            </a:r>
+            <a:r>
+              <a:rPr lang="de-CH" dirty="0" err="1"/>
+              <a:t>implement</a:t>
+            </a:r>
+            <a:r>
+              <a:rPr lang="de-CH" dirty="0"/>
+              <a:t> </a:t>
+            </a:r>
+            <a:r>
+              <a:rPr lang="de-CH" dirty="0" err="1"/>
+              <a:t>the</a:t>
+            </a:r>
+            <a:r>
+              <a:rPr lang="de-CH" dirty="0"/>
+              <a:t> </a:t>
+            </a:r>
+            <a:r>
+              <a:rPr lang="de-CH" dirty="0" err="1"/>
+              <a:t>main</a:t>
+            </a:r>
+            <a:r>
+              <a:rPr lang="de-CH" dirty="0"/>
+              <a:t> </a:t>
+            </a:r>
+            <a:r>
+              <a:rPr lang="de-CH" dirty="0" err="1"/>
+              <a:t>operations</a:t>
+            </a:r>
+            <a:r>
+              <a:rPr lang="de-CH" dirty="0"/>
+              <a:t> in numpy</a:t>
+            </a:r>
+          </a:p>
+          <a:p>
+            <a:pPr>
+              <a:buFont typeface="Wingdings" panose="05000000000000000000" pitchFamily="2" charset="2"/>
+              <a:buChar char="q"/>
+            </a:pPr>
+            <a:r>
+              <a:rPr lang="de-CH" dirty="0"/>
+              <a:t> The </a:t>
+            </a:r>
+            <a:r>
+              <a:rPr lang="de-CH" dirty="0" err="1"/>
+              <a:t>student</a:t>
+            </a:r>
+            <a:r>
+              <a:rPr lang="de-CH" dirty="0"/>
+              <a:t> is </a:t>
+            </a:r>
+            <a:r>
+              <a:rPr lang="de-CH" dirty="0" err="1"/>
+              <a:t>able</a:t>
+            </a:r>
+            <a:r>
+              <a:rPr lang="de-CH" dirty="0"/>
+              <a:t> to </a:t>
+            </a:r>
+            <a:r>
+              <a:rPr lang="de-CH" dirty="0" err="1"/>
+              <a:t>understand</a:t>
+            </a:r>
+            <a:r>
+              <a:rPr lang="de-CH" dirty="0"/>
+              <a:t> </a:t>
+            </a:r>
+            <a:r>
+              <a:rPr lang="de-CH" dirty="0" err="1"/>
+              <a:t>the</a:t>
+            </a:r>
+            <a:r>
+              <a:rPr lang="de-CH" dirty="0"/>
+              <a:t> </a:t>
+            </a:r>
+            <a:r>
+              <a:rPr lang="de-CH" dirty="0" err="1"/>
+              <a:t>difference</a:t>
+            </a:r>
+            <a:r>
+              <a:rPr lang="de-CH" dirty="0"/>
+              <a:t> in how numpy </a:t>
+            </a:r>
+            <a:r>
+              <a:rPr lang="de-CH" dirty="0" err="1"/>
+              <a:t>operates</a:t>
+            </a:r>
+            <a:r>
+              <a:rPr lang="de-CH" dirty="0"/>
+              <a:t> on </a:t>
+            </a:r>
+            <a:r>
+              <a:rPr lang="de-CH" dirty="0" err="1"/>
+              <a:t>arrays</a:t>
+            </a:r>
+            <a:endParaRPr lang="de-CH" dirty="0"/>
+          </a:p>
+          <a:p>
+            <a:pPr>
+              <a:buFont typeface="Wingdings" panose="05000000000000000000" pitchFamily="2" charset="2"/>
+              <a:buChar char="q"/>
+            </a:pPr>
+            <a:r>
+              <a:rPr lang="de-CH" dirty="0"/>
+              <a:t> The </a:t>
+            </a:r>
+            <a:r>
+              <a:rPr lang="de-CH" dirty="0" err="1"/>
+              <a:t>student</a:t>
+            </a:r>
+            <a:r>
+              <a:rPr lang="de-CH" dirty="0"/>
+              <a:t> is </a:t>
+            </a:r>
+            <a:r>
+              <a:rPr lang="de-CH" dirty="0" err="1"/>
+              <a:t>able</a:t>
+            </a:r>
+            <a:r>
+              <a:rPr lang="de-CH" dirty="0"/>
+              <a:t> to </a:t>
+            </a:r>
+            <a:r>
+              <a:rPr lang="de-CH" dirty="0" err="1"/>
+              <a:t>use</a:t>
+            </a:r>
+            <a:r>
+              <a:rPr lang="de-CH" dirty="0"/>
+              <a:t> </a:t>
+            </a:r>
+            <a:r>
+              <a:rPr lang="de-CH" dirty="0" err="1"/>
+              <a:t>the</a:t>
+            </a:r>
+            <a:r>
+              <a:rPr lang="de-CH" dirty="0"/>
+              <a:t> </a:t>
+            </a:r>
+            <a:r>
+              <a:rPr lang="de-CH" dirty="0" err="1"/>
+              <a:t>concepts</a:t>
+            </a:r>
+            <a:r>
+              <a:rPr lang="de-CH" dirty="0"/>
+              <a:t> to </a:t>
+            </a:r>
+            <a:r>
+              <a:rPr lang="de-CH" dirty="0" err="1"/>
+              <a:t>implement</a:t>
+            </a:r>
+            <a:r>
+              <a:rPr lang="de-CH" dirty="0"/>
+              <a:t> a </a:t>
+            </a:r>
+            <a:r>
+              <a:rPr lang="de-CH" dirty="0" err="1"/>
+              <a:t>complete</a:t>
+            </a:r>
+            <a:r>
+              <a:rPr lang="de-CH" dirty="0"/>
+              <a:t> linear </a:t>
+            </a:r>
+            <a:r>
+              <a:rPr lang="de-CH" dirty="0" err="1"/>
+              <a:t>regression</a:t>
+            </a:r>
+            <a:r>
+              <a:rPr lang="de-CH" dirty="0"/>
+              <a:t> </a:t>
+            </a:r>
+            <a:r>
+              <a:rPr lang="de-CH" dirty="0" err="1"/>
+              <a:t>model</a:t>
+            </a:r>
+            <a:r>
+              <a:rPr lang="de-CH" dirty="0"/>
+              <a:t> from </a:t>
+            </a:r>
+            <a:r>
+              <a:rPr lang="de-CH" dirty="0" err="1"/>
+              <a:t>scratch</a:t>
+            </a:r>
+            <a:endParaRPr lang="de-CH" dirty="0"/>
+          </a:p>
+          <a:p>
+            <a:pPr marL="0" indent="0">
+              <a:buNone/>
+            </a:pPr>
+            <a:endParaRPr lang="en-CH" dirty="0"/>
+          </a:p>
+        </p:txBody>
+      </p:sp>
+    </p:spTree>
+    <p:extLst>
+      <p:ext uri="{BB962C8B-B14F-4D97-AF65-F5344CB8AC3E}">
+        <p14:creationId xmlns:p14="http://schemas.microsoft.com/office/powerpoint/2010/main" val="3896805427"/>
+      </p:ext>
+    </p:extLst>
+  </p:cSld>
+  <p:clrMapOvr>
+    <a:masterClrMapping/>
+  </p:clrMapOvr>
+</p:sld>
+</file>
+
+<file path=ppt/slides/slide8.xml><?xml version="1.0" encoding="utf-8"?>
+<p:sld xmlns:a="http://schemas.openxmlformats.org/drawingml/2006/main" xmlns:r="http://schemas.openxmlformats.org/officeDocument/2006/relationships" xmlns:p="http://schemas.openxmlformats.org/presentationml/2006/main">
+  <p:cSld>
+    <p:spTree>
+      <p:nvGrpSpPr>
+        <p:cNvPr id="1" name=""/>
+        <p:cNvGrpSpPr/>
+        <p:nvPr/>
+      </p:nvGrpSpPr>
+      <p:grpSpPr>
+        <a:xfrm>
+          <a:off x="0" y="0"/>
+          <a:ext cx="0" cy="0"/>
+          <a:chOff x="0" y="0"/>
+          <a:chExt cx="0" cy="0"/>
+        </a:xfrm>
+      </p:grpSpPr>
+      <p:sp>
+        <p:nvSpPr>
+          <p:cNvPr id="2" name="Title 1">
+            <a:extLst>
+              <a:ext uri="{FF2B5EF4-FFF2-40B4-BE49-F238E27FC236}">
+                <a16:creationId xmlns:a16="http://schemas.microsoft.com/office/drawing/2014/main" id="{D58A28C4-517E-44E4-9BD7-024C12BB4A4F}"/>
+              </a:ext>
+            </a:extLst>
+          </p:cNvPr>
+          <p:cNvSpPr>
+            <a:spLocks noGrp="1"/>
+          </p:cNvSpPr>
+          <p:nvPr>
+            <p:ph type="title"/>
+          </p:nvPr>
+        </p:nvSpPr>
+        <p:spPr/>
+        <p:txBody>
+          <a:bodyPr/>
+          <a:lstStyle/>
+          <a:p>
+            <a:r>
+              <a:rPr lang="de-CH" dirty="0"/>
+              <a:t>Learning Goals</a:t>
+            </a:r>
+            <a:endParaRPr lang="en-CH" dirty="0"/>
+          </a:p>
+        </p:txBody>
+      </p:sp>
+      <p:sp>
+        <p:nvSpPr>
+          <p:cNvPr id="3" name="Content Placeholder 2">
+            <a:extLst>
+              <a:ext uri="{FF2B5EF4-FFF2-40B4-BE49-F238E27FC236}">
+                <a16:creationId xmlns:a16="http://schemas.microsoft.com/office/drawing/2014/main" id="{20FB50C2-9865-4C24-8D48-F7BF0D6C2901}"/>
+              </a:ext>
+            </a:extLst>
+          </p:cNvPr>
+          <p:cNvSpPr>
+            <a:spLocks noGrp="1"/>
+          </p:cNvSpPr>
+          <p:nvPr>
+            <p:ph idx="1"/>
+          </p:nvPr>
+        </p:nvSpPr>
+        <p:spPr>
+          <a:xfrm>
+            <a:off x="838200" y="1690688"/>
+            <a:ext cx="10515600" cy="4486275"/>
+          </a:xfrm>
+        </p:spPr>
+        <p:txBody>
+          <a:bodyPr>
+            <a:normAutofit lnSpcReduction="10000"/>
+          </a:bodyPr>
+          <a:lstStyle/>
+          <a:p>
+            <a:pPr>
+              <a:buFont typeface="Wingdings" panose="05000000000000000000" pitchFamily="2" charset="2"/>
+              <a:buChar char="ü"/>
+            </a:pPr>
+            <a:r>
+              <a:rPr lang="de-CH" dirty="0"/>
+              <a:t> The </a:t>
+            </a:r>
+            <a:r>
+              <a:rPr lang="de-CH" dirty="0" err="1"/>
+              <a:t>student</a:t>
+            </a:r>
+            <a:r>
+              <a:rPr lang="de-CH" dirty="0"/>
+              <a:t> is </a:t>
+            </a:r>
+            <a:r>
+              <a:rPr lang="de-CH" dirty="0" err="1"/>
+              <a:t>able</a:t>
+            </a:r>
+            <a:r>
+              <a:rPr lang="de-CH" dirty="0"/>
+              <a:t> to </a:t>
+            </a:r>
+            <a:r>
+              <a:rPr lang="de-CH" dirty="0" err="1"/>
+              <a:t>explain</a:t>
+            </a:r>
+            <a:r>
+              <a:rPr lang="de-CH" dirty="0"/>
+              <a:t> what is a </a:t>
+            </a:r>
+            <a:r>
+              <a:rPr lang="de-CH" dirty="0" err="1"/>
+              <a:t>vector</a:t>
+            </a:r>
+            <a:r>
+              <a:rPr lang="de-CH" dirty="0"/>
+              <a:t> and a </a:t>
+            </a:r>
+            <a:r>
+              <a:rPr lang="de-CH" dirty="0" err="1"/>
+              <a:t>matrix</a:t>
+            </a:r>
+            <a:endParaRPr lang="de-CH" dirty="0"/>
+          </a:p>
+          <a:p>
+            <a:pPr>
+              <a:buFont typeface="Wingdings" panose="05000000000000000000" pitchFamily="2" charset="2"/>
+              <a:buChar char="ü"/>
+            </a:pPr>
+            <a:r>
+              <a:rPr lang="de-CH" dirty="0"/>
+              <a:t> The </a:t>
+            </a:r>
+            <a:r>
+              <a:rPr lang="de-CH" dirty="0" err="1"/>
+              <a:t>student</a:t>
+            </a:r>
+            <a:r>
+              <a:rPr lang="de-CH" dirty="0"/>
+              <a:t> is </a:t>
+            </a:r>
+            <a:r>
+              <a:rPr lang="de-CH" dirty="0" err="1"/>
+              <a:t>able</a:t>
+            </a:r>
+            <a:r>
+              <a:rPr lang="de-CH" dirty="0"/>
+              <a:t> to </a:t>
+            </a:r>
+            <a:r>
+              <a:rPr lang="de-CH" dirty="0" err="1"/>
+              <a:t>understand</a:t>
+            </a:r>
+            <a:r>
+              <a:rPr lang="de-CH" dirty="0"/>
+              <a:t> </a:t>
+            </a:r>
+            <a:r>
+              <a:rPr lang="de-CH" dirty="0" err="1"/>
+              <a:t>the</a:t>
+            </a:r>
+            <a:r>
+              <a:rPr lang="de-CH" dirty="0"/>
+              <a:t> </a:t>
+            </a:r>
+            <a:r>
+              <a:rPr lang="de-CH" dirty="0" err="1"/>
+              <a:t>main</a:t>
+            </a:r>
+            <a:r>
+              <a:rPr lang="de-CH" dirty="0"/>
+              <a:t> </a:t>
+            </a:r>
+            <a:r>
+              <a:rPr lang="de-CH" dirty="0" err="1"/>
+              <a:t>operations</a:t>
+            </a:r>
+            <a:r>
+              <a:rPr lang="de-CH" dirty="0"/>
+              <a:t> you </a:t>
+            </a:r>
+            <a:r>
+              <a:rPr lang="de-CH" dirty="0" err="1"/>
+              <a:t>can</a:t>
+            </a:r>
+            <a:r>
+              <a:rPr lang="de-CH" dirty="0"/>
+              <a:t> perform on a </a:t>
+            </a:r>
+            <a:r>
+              <a:rPr lang="de-CH" dirty="0" err="1"/>
+              <a:t>vector</a:t>
+            </a:r>
+            <a:r>
+              <a:rPr lang="de-CH" dirty="0"/>
+              <a:t> and a </a:t>
+            </a:r>
+            <a:r>
+              <a:rPr lang="de-CH" dirty="0" err="1"/>
+              <a:t>matrix</a:t>
+            </a:r>
+            <a:endParaRPr lang="de-CH" dirty="0"/>
+          </a:p>
+          <a:p>
+            <a:pPr>
+              <a:buFont typeface="Wingdings" panose="05000000000000000000" pitchFamily="2" charset="2"/>
+              <a:buChar char="ü"/>
+            </a:pPr>
+            <a:r>
+              <a:rPr lang="de-CH" dirty="0"/>
+              <a:t> The </a:t>
+            </a:r>
+            <a:r>
+              <a:rPr lang="de-CH" dirty="0" err="1"/>
+              <a:t>student</a:t>
+            </a:r>
+            <a:r>
+              <a:rPr lang="de-CH" dirty="0"/>
+              <a:t> is </a:t>
+            </a:r>
+            <a:r>
+              <a:rPr lang="de-CH" dirty="0" err="1"/>
+              <a:t>able</a:t>
+            </a:r>
+            <a:r>
+              <a:rPr lang="de-CH" dirty="0"/>
+              <a:t> to </a:t>
+            </a:r>
+            <a:r>
+              <a:rPr lang="de-CH" dirty="0" err="1"/>
+              <a:t>implement</a:t>
+            </a:r>
+            <a:r>
+              <a:rPr lang="de-CH" dirty="0"/>
+              <a:t> </a:t>
+            </a:r>
+            <a:r>
+              <a:rPr lang="de-CH" dirty="0" err="1"/>
+              <a:t>the</a:t>
+            </a:r>
+            <a:r>
+              <a:rPr lang="de-CH" dirty="0"/>
+              <a:t> </a:t>
+            </a:r>
+            <a:r>
+              <a:rPr lang="de-CH" dirty="0" err="1"/>
+              <a:t>main</a:t>
+            </a:r>
+            <a:r>
+              <a:rPr lang="de-CH" dirty="0"/>
+              <a:t> </a:t>
+            </a:r>
+            <a:r>
+              <a:rPr lang="de-CH" dirty="0" err="1"/>
+              <a:t>operations</a:t>
+            </a:r>
+            <a:r>
+              <a:rPr lang="de-CH" dirty="0"/>
+              <a:t> in </a:t>
+            </a:r>
+            <a:r>
+              <a:rPr lang="de-CH" dirty="0" err="1"/>
+              <a:t>basic</a:t>
+            </a:r>
+            <a:r>
+              <a:rPr lang="de-CH" dirty="0"/>
+              <a:t> Python</a:t>
+            </a:r>
+          </a:p>
+          <a:p>
+            <a:pPr>
+              <a:buFont typeface="Wingdings" panose="05000000000000000000" pitchFamily="2" charset="2"/>
+              <a:buChar char="ü"/>
+            </a:pPr>
+            <a:r>
+              <a:rPr lang="de-CH" dirty="0"/>
+              <a:t> The </a:t>
+            </a:r>
+            <a:r>
+              <a:rPr lang="de-CH" dirty="0" err="1"/>
+              <a:t>student</a:t>
+            </a:r>
+            <a:r>
+              <a:rPr lang="de-CH" dirty="0"/>
+              <a:t> is </a:t>
+            </a:r>
+            <a:r>
+              <a:rPr lang="de-CH" dirty="0" err="1"/>
+              <a:t>able</a:t>
+            </a:r>
+            <a:r>
+              <a:rPr lang="de-CH" dirty="0"/>
+              <a:t> to </a:t>
+            </a:r>
+            <a:r>
+              <a:rPr lang="de-CH" dirty="0" err="1"/>
+              <a:t>implement</a:t>
+            </a:r>
+            <a:r>
+              <a:rPr lang="de-CH" dirty="0"/>
+              <a:t> </a:t>
+            </a:r>
+            <a:r>
+              <a:rPr lang="de-CH" dirty="0" err="1"/>
+              <a:t>the</a:t>
+            </a:r>
+            <a:r>
+              <a:rPr lang="de-CH" dirty="0"/>
+              <a:t> </a:t>
+            </a:r>
+            <a:r>
+              <a:rPr lang="de-CH" dirty="0" err="1"/>
+              <a:t>main</a:t>
+            </a:r>
+            <a:r>
+              <a:rPr lang="de-CH" dirty="0"/>
+              <a:t> </a:t>
+            </a:r>
+            <a:r>
+              <a:rPr lang="de-CH" dirty="0" err="1"/>
+              <a:t>operations</a:t>
+            </a:r>
+            <a:r>
+              <a:rPr lang="de-CH" dirty="0"/>
+              <a:t> in numpy</a:t>
+            </a:r>
+          </a:p>
+          <a:p>
+            <a:pPr>
+              <a:buFont typeface="Wingdings" panose="05000000000000000000" pitchFamily="2" charset="2"/>
+              <a:buChar char="ü"/>
+            </a:pPr>
+            <a:r>
+              <a:rPr lang="de-CH" dirty="0"/>
+              <a:t> The </a:t>
+            </a:r>
+            <a:r>
+              <a:rPr lang="de-CH" dirty="0" err="1"/>
+              <a:t>student</a:t>
+            </a:r>
+            <a:r>
+              <a:rPr lang="de-CH" dirty="0"/>
+              <a:t> is </a:t>
+            </a:r>
+            <a:r>
+              <a:rPr lang="de-CH" dirty="0" err="1"/>
+              <a:t>able</a:t>
+            </a:r>
+            <a:r>
+              <a:rPr lang="de-CH" dirty="0"/>
+              <a:t> to </a:t>
+            </a:r>
+            <a:r>
+              <a:rPr lang="de-CH" dirty="0" err="1"/>
+              <a:t>understand</a:t>
+            </a:r>
+            <a:r>
+              <a:rPr lang="de-CH" dirty="0"/>
+              <a:t> </a:t>
+            </a:r>
+            <a:r>
+              <a:rPr lang="de-CH" dirty="0" err="1"/>
+              <a:t>the</a:t>
+            </a:r>
+            <a:r>
+              <a:rPr lang="de-CH" dirty="0"/>
+              <a:t> </a:t>
+            </a:r>
+            <a:r>
+              <a:rPr lang="de-CH" dirty="0" err="1"/>
+              <a:t>difference</a:t>
+            </a:r>
+            <a:r>
+              <a:rPr lang="de-CH" dirty="0"/>
+              <a:t> in how numpy </a:t>
+            </a:r>
+            <a:r>
+              <a:rPr lang="de-CH" dirty="0" err="1"/>
+              <a:t>operates</a:t>
+            </a:r>
+            <a:r>
+              <a:rPr lang="de-CH" dirty="0"/>
+              <a:t> on </a:t>
+            </a:r>
+            <a:r>
+              <a:rPr lang="de-CH" dirty="0" err="1"/>
+              <a:t>arrays</a:t>
+            </a:r>
+            <a:endParaRPr lang="de-CH" dirty="0"/>
+          </a:p>
+          <a:p>
+            <a:pPr>
+              <a:buFont typeface="Wingdings" panose="05000000000000000000" pitchFamily="2" charset="2"/>
+              <a:buChar char="q"/>
+            </a:pPr>
+            <a:r>
+              <a:rPr lang="de-CH" dirty="0"/>
+              <a:t> The </a:t>
+            </a:r>
+            <a:r>
+              <a:rPr lang="de-CH" dirty="0" err="1"/>
+              <a:t>student</a:t>
+            </a:r>
+            <a:r>
+              <a:rPr lang="de-CH" dirty="0"/>
+              <a:t> is </a:t>
+            </a:r>
+            <a:r>
+              <a:rPr lang="de-CH" dirty="0" err="1"/>
+              <a:t>able</a:t>
+            </a:r>
+            <a:r>
+              <a:rPr lang="de-CH" dirty="0"/>
+              <a:t> to </a:t>
+            </a:r>
+            <a:r>
+              <a:rPr lang="de-CH" dirty="0" err="1"/>
+              <a:t>use</a:t>
+            </a:r>
+            <a:r>
+              <a:rPr lang="de-CH" dirty="0"/>
+              <a:t> </a:t>
+            </a:r>
+            <a:r>
+              <a:rPr lang="de-CH" dirty="0" err="1"/>
+              <a:t>the</a:t>
+            </a:r>
+            <a:r>
+              <a:rPr lang="de-CH" dirty="0"/>
+              <a:t> </a:t>
+            </a:r>
+            <a:r>
+              <a:rPr lang="de-CH" dirty="0" err="1"/>
+              <a:t>concepts</a:t>
+            </a:r>
+            <a:r>
+              <a:rPr lang="de-CH" dirty="0"/>
+              <a:t> to </a:t>
+            </a:r>
+            <a:r>
+              <a:rPr lang="de-CH" dirty="0" err="1"/>
+              <a:t>implement</a:t>
+            </a:r>
+            <a:r>
+              <a:rPr lang="de-CH" dirty="0"/>
+              <a:t> a </a:t>
+            </a:r>
+            <a:r>
+              <a:rPr lang="de-CH" dirty="0" err="1"/>
+              <a:t>complete</a:t>
+            </a:r>
+            <a:r>
+              <a:rPr lang="de-CH" dirty="0"/>
+              <a:t> linear </a:t>
+            </a:r>
+            <a:r>
+              <a:rPr lang="de-CH" dirty="0" err="1"/>
+              <a:t>regression</a:t>
+            </a:r>
+            <a:r>
+              <a:rPr lang="de-CH" dirty="0"/>
+              <a:t> </a:t>
+            </a:r>
+            <a:r>
+              <a:rPr lang="de-CH" dirty="0" err="1"/>
+              <a:t>model</a:t>
+            </a:r>
+            <a:r>
+              <a:rPr lang="de-CH" dirty="0"/>
+              <a:t> from </a:t>
+            </a:r>
+            <a:r>
+              <a:rPr lang="de-CH" dirty="0" err="1"/>
+              <a:t>scratch</a:t>
+            </a:r>
+            <a:endParaRPr lang="de-CH" dirty="0"/>
+          </a:p>
+          <a:p>
+            <a:pPr marL="0" indent="0">
+              <a:buNone/>
+            </a:pPr>
+            <a:endParaRPr lang="en-CH" dirty="0"/>
+          </a:p>
+        </p:txBody>
+      </p:sp>
+    </p:spTree>
+    <p:extLst>
+      <p:ext uri="{BB962C8B-B14F-4D97-AF65-F5344CB8AC3E}">
+        <p14:creationId xmlns:p14="http://schemas.microsoft.com/office/powerpoint/2010/main" val="662266848"/>
+      </p:ext>
+    </p:extLst>
+  </p:cSld>
+  <p:clrMapOvr>
+    <a:masterClrMapping/>
+  </p:clrMapOvr>
+</p:sld>
+</file>
+
+<file path=ppt/slides/slide9.xml><?xml version="1.0" encoding="utf-8"?>
+<p:sld xmlns:a="http://schemas.openxmlformats.org/drawingml/2006/main" xmlns:r="http://schemas.openxmlformats.org/officeDocument/2006/relationships" xmlns:p="http://schemas.openxmlformats.org/presentationml/2006/main">
+  <p:cSld>
+    <p:spTree>
+      <p:nvGrpSpPr>
+        <p:cNvPr id="1" name=""/>
+        <p:cNvGrpSpPr/>
+        <p:nvPr/>
+      </p:nvGrpSpPr>
+      <p:grpSpPr>
+        <a:xfrm>
+          <a:off x="0" y="0"/>
+          <a:ext cx="0" cy="0"/>
+          <a:chOff x="0" y="0"/>
+          <a:chExt cx="0" cy="0"/>
+        </a:xfrm>
+      </p:grpSpPr>
+      <p:sp>
+        <p:nvSpPr>
+          <p:cNvPr id="2" name="Title 1">
+            <a:extLst>
+              <a:ext uri="{FF2B5EF4-FFF2-40B4-BE49-F238E27FC236}">
+                <a16:creationId xmlns:a16="http://schemas.microsoft.com/office/drawing/2014/main" id="{D58A28C4-517E-44E4-9BD7-024C12BB4A4F}"/>
+              </a:ext>
+            </a:extLst>
+          </p:cNvPr>
+          <p:cNvSpPr>
+            <a:spLocks noGrp="1"/>
+          </p:cNvSpPr>
+          <p:nvPr>
+            <p:ph type="title"/>
+          </p:nvPr>
+        </p:nvSpPr>
+        <p:spPr/>
+        <p:txBody>
+          <a:bodyPr/>
+          <a:lstStyle/>
+          <a:p>
+            <a:r>
+              <a:rPr lang="de-CH" dirty="0"/>
+              <a:t>Learning Goals</a:t>
+            </a:r>
+            <a:endParaRPr lang="en-CH" dirty="0"/>
+          </a:p>
+        </p:txBody>
+      </p:sp>
+      <p:sp>
+        <p:nvSpPr>
+          <p:cNvPr id="3" name="Content Placeholder 2">
+            <a:extLst>
+              <a:ext uri="{FF2B5EF4-FFF2-40B4-BE49-F238E27FC236}">
+                <a16:creationId xmlns:a16="http://schemas.microsoft.com/office/drawing/2014/main" id="{20FB50C2-9865-4C24-8D48-F7BF0D6C2901}"/>
+              </a:ext>
+            </a:extLst>
+          </p:cNvPr>
+          <p:cNvSpPr>
+            <a:spLocks noGrp="1"/>
+          </p:cNvSpPr>
+          <p:nvPr>
+            <p:ph idx="1"/>
+          </p:nvPr>
+        </p:nvSpPr>
+        <p:spPr>
+          <a:xfrm>
+            <a:off x="838200" y="1690688"/>
+            <a:ext cx="10515600" cy="4486275"/>
+          </a:xfrm>
+        </p:spPr>
+        <p:txBody>
+          <a:bodyPr>
+            <a:normAutofit lnSpcReduction="10000"/>
+          </a:bodyPr>
+          <a:lstStyle/>
+          <a:p>
+            <a:pPr>
+              <a:buFont typeface="Wingdings" panose="05000000000000000000" pitchFamily="2" charset="2"/>
+              <a:buChar char="ü"/>
+            </a:pPr>
+            <a:r>
+              <a:rPr lang="de-CH" dirty="0"/>
+              <a:t> The </a:t>
+            </a:r>
+            <a:r>
+              <a:rPr lang="de-CH" dirty="0" err="1"/>
+              <a:t>student</a:t>
+            </a:r>
+            <a:r>
+              <a:rPr lang="de-CH" dirty="0"/>
+              <a:t> is </a:t>
+            </a:r>
+            <a:r>
+              <a:rPr lang="de-CH" dirty="0" err="1"/>
+              <a:t>able</a:t>
+            </a:r>
+            <a:r>
+              <a:rPr lang="de-CH" dirty="0"/>
+              <a:t> to </a:t>
+            </a:r>
+            <a:r>
+              <a:rPr lang="de-CH" dirty="0" err="1"/>
+              <a:t>explain</a:t>
+            </a:r>
+            <a:r>
+              <a:rPr lang="de-CH" dirty="0"/>
+              <a:t> what is a </a:t>
+            </a:r>
+            <a:r>
+              <a:rPr lang="de-CH" dirty="0" err="1"/>
+              <a:t>vector</a:t>
+            </a:r>
+            <a:r>
+              <a:rPr lang="de-CH" dirty="0"/>
+              <a:t> and a </a:t>
+            </a:r>
+            <a:r>
+              <a:rPr lang="de-CH" dirty="0" err="1"/>
+              <a:t>matrix</a:t>
+            </a:r>
+            <a:endParaRPr lang="de-CH" dirty="0"/>
+          </a:p>
+          <a:p>
+            <a:pPr>
+              <a:buFont typeface="Wingdings" panose="05000000000000000000" pitchFamily="2" charset="2"/>
+              <a:buChar char="ü"/>
+            </a:pPr>
+            <a:r>
+              <a:rPr lang="de-CH" dirty="0"/>
+              <a:t> The </a:t>
+            </a:r>
+            <a:r>
+              <a:rPr lang="de-CH" dirty="0" err="1"/>
+              <a:t>student</a:t>
+            </a:r>
+            <a:r>
+              <a:rPr lang="de-CH" dirty="0"/>
+              <a:t> is </a:t>
+            </a:r>
+            <a:r>
+              <a:rPr lang="de-CH" dirty="0" err="1"/>
+              <a:t>able</a:t>
+            </a:r>
+            <a:r>
+              <a:rPr lang="de-CH" dirty="0"/>
+              <a:t> to </a:t>
+            </a:r>
+            <a:r>
+              <a:rPr lang="de-CH" dirty="0" err="1"/>
+              <a:t>understand</a:t>
+            </a:r>
+            <a:r>
+              <a:rPr lang="de-CH" dirty="0"/>
+              <a:t> </a:t>
+            </a:r>
+            <a:r>
+              <a:rPr lang="de-CH" dirty="0" err="1"/>
+              <a:t>the</a:t>
+            </a:r>
+            <a:r>
+              <a:rPr lang="de-CH" dirty="0"/>
+              <a:t> </a:t>
+            </a:r>
+            <a:r>
+              <a:rPr lang="de-CH" dirty="0" err="1"/>
+              <a:t>main</a:t>
+            </a:r>
+            <a:r>
+              <a:rPr lang="de-CH" dirty="0"/>
+              <a:t> </a:t>
+            </a:r>
+            <a:r>
+              <a:rPr lang="de-CH" dirty="0" err="1"/>
+              <a:t>operations</a:t>
+            </a:r>
+            <a:r>
+              <a:rPr lang="de-CH" dirty="0"/>
+              <a:t> you </a:t>
+            </a:r>
+            <a:r>
+              <a:rPr lang="de-CH" dirty="0" err="1"/>
+              <a:t>can</a:t>
+            </a:r>
+            <a:r>
+              <a:rPr lang="de-CH" dirty="0"/>
+              <a:t> perform on a </a:t>
+            </a:r>
+            <a:r>
+              <a:rPr lang="de-CH" dirty="0" err="1"/>
+              <a:t>vector</a:t>
+            </a:r>
+            <a:r>
+              <a:rPr lang="de-CH" dirty="0"/>
+              <a:t> and a </a:t>
+            </a:r>
+            <a:r>
+              <a:rPr lang="de-CH" dirty="0" err="1"/>
+              <a:t>matrix</a:t>
+            </a:r>
+            <a:endParaRPr lang="de-CH" dirty="0"/>
+          </a:p>
+          <a:p>
+            <a:pPr>
+              <a:buFont typeface="Wingdings" panose="05000000000000000000" pitchFamily="2" charset="2"/>
+              <a:buChar char="ü"/>
+            </a:pPr>
+            <a:r>
+              <a:rPr lang="de-CH" dirty="0"/>
+              <a:t> The </a:t>
+            </a:r>
+            <a:r>
+              <a:rPr lang="de-CH" dirty="0" err="1"/>
+              <a:t>student</a:t>
+            </a:r>
+            <a:r>
+              <a:rPr lang="de-CH" dirty="0"/>
+              <a:t> is </a:t>
+            </a:r>
+            <a:r>
+              <a:rPr lang="de-CH" dirty="0" err="1"/>
+              <a:t>able</a:t>
+            </a:r>
+            <a:r>
+              <a:rPr lang="de-CH" dirty="0"/>
+              <a:t> to </a:t>
+            </a:r>
+            <a:r>
+              <a:rPr lang="de-CH" dirty="0" err="1"/>
+              <a:t>implement</a:t>
+            </a:r>
+            <a:r>
+              <a:rPr lang="de-CH" dirty="0"/>
+              <a:t> </a:t>
+            </a:r>
+            <a:r>
+              <a:rPr lang="de-CH" dirty="0" err="1"/>
+              <a:t>the</a:t>
+            </a:r>
+            <a:r>
+              <a:rPr lang="de-CH" dirty="0"/>
+              <a:t> </a:t>
+            </a:r>
+            <a:r>
+              <a:rPr lang="de-CH" dirty="0" err="1"/>
+              <a:t>main</a:t>
+            </a:r>
+            <a:r>
+              <a:rPr lang="de-CH" dirty="0"/>
+              <a:t> </a:t>
+            </a:r>
+            <a:r>
+              <a:rPr lang="de-CH" dirty="0" err="1"/>
+              <a:t>operations</a:t>
+            </a:r>
+            <a:r>
+              <a:rPr lang="de-CH" dirty="0"/>
+              <a:t> in </a:t>
+            </a:r>
+            <a:r>
+              <a:rPr lang="de-CH" dirty="0" err="1"/>
+              <a:t>basic</a:t>
+            </a:r>
+            <a:r>
+              <a:rPr lang="de-CH" dirty="0"/>
+              <a:t> Python</a:t>
+            </a:r>
+          </a:p>
+          <a:p>
+            <a:pPr>
+              <a:buFont typeface="Wingdings" panose="05000000000000000000" pitchFamily="2" charset="2"/>
+              <a:buChar char="ü"/>
+            </a:pPr>
+            <a:r>
+              <a:rPr lang="de-CH" dirty="0"/>
+              <a:t> The </a:t>
+            </a:r>
+            <a:r>
+              <a:rPr lang="de-CH" dirty="0" err="1"/>
+              <a:t>student</a:t>
+            </a:r>
+            <a:r>
+              <a:rPr lang="de-CH" dirty="0"/>
+              <a:t> is </a:t>
+            </a:r>
+            <a:r>
+              <a:rPr lang="de-CH" dirty="0" err="1"/>
+              <a:t>able</a:t>
+            </a:r>
+            <a:r>
+              <a:rPr lang="de-CH" dirty="0"/>
+              <a:t> to </a:t>
+            </a:r>
+            <a:r>
+              <a:rPr lang="de-CH" dirty="0" err="1"/>
+              <a:t>implement</a:t>
+            </a:r>
+            <a:r>
+              <a:rPr lang="de-CH" dirty="0"/>
+              <a:t> </a:t>
+            </a:r>
+            <a:r>
+              <a:rPr lang="de-CH" dirty="0" err="1"/>
+              <a:t>the</a:t>
+            </a:r>
+            <a:r>
+              <a:rPr lang="de-CH" dirty="0"/>
+              <a:t> </a:t>
+            </a:r>
+            <a:r>
+              <a:rPr lang="de-CH" dirty="0" err="1"/>
+              <a:t>main</a:t>
+            </a:r>
+            <a:r>
+              <a:rPr lang="de-CH" dirty="0"/>
+              <a:t> </a:t>
+            </a:r>
+            <a:r>
+              <a:rPr lang="de-CH" dirty="0" err="1"/>
+              <a:t>operations</a:t>
+            </a:r>
+            <a:r>
+              <a:rPr lang="de-CH" dirty="0"/>
+              <a:t> in numpy</a:t>
+            </a:r>
+          </a:p>
+          <a:p>
+            <a:pPr>
+              <a:buFont typeface="Wingdings" panose="05000000000000000000" pitchFamily="2" charset="2"/>
+              <a:buChar char="ü"/>
+            </a:pPr>
+            <a:r>
+              <a:rPr lang="de-CH" dirty="0"/>
+              <a:t> The </a:t>
+            </a:r>
+            <a:r>
+              <a:rPr lang="de-CH" dirty="0" err="1"/>
+              <a:t>student</a:t>
+            </a:r>
+            <a:r>
+              <a:rPr lang="de-CH" dirty="0"/>
+              <a:t> is </a:t>
+            </a:r>
+            <a:r>
+              <a:rPr lang="de-CH" dirty="0" err="1"/>
+              <a:t>able</a:t>
+            </a:r>
+            <a:r>
+              <a:rPr lang="de-CH" dirty="0"/>
+              <a:t> to </a:t>
+            </a:r>
+            <a:r>
+              <a:rPr lang="de-CH" dirty="0" err="1"/>
+              <a:t>understand</a:t>
+            </a:r>
+            <a:r>
+              <a:rPr lang="de-CH" dirty="0"/>
+              <a:t> </a:t>
+            </a:r>
+            <a:r>
+              <a:rPr lang="de-CH" dirty="0" err="1"/>
+              <a:t>the</a:t>
+            </a:r>
+            <a:r>
+              <a:rPr lang="de-CH" dirty="0"/>
+              <a:t> </a:t>
+            </a:r>
+            <a:r>
+              <a:rPr lang="de-CH" dirty="0" err="1"/>
+              <a:t>difference</a:t>
+            </a:r>
+            <a:r>
+              <a:rPr lang="de-CH" dirty="0"/>
+              <a:t> in how numpy </a:t>
+            </a:r>
+            <a:r>
+              <a:rPr lang="de-CH" dirty="0" err="1"/>
+              <a:t>operates</a:t>
+            </a:r>
+            <a:r>
+              <a:rPr lang="de-CH" dirty="0"/>
+              <a:t> on </a:t>
+            </a:r>
+            <a:r>
+              <a:rPr lang="de-CH" dirty="0" err="1"/>
+              <a:t>arrays</a:t>
+            </a:r>
+            <a:endParaRPr lang="de-CH" dirty="0"/>
+          </a:p>
+          <a:p>
+            <a:pPr>
+              <a:buFont typeface="Wingdings" panose="05000000000000000000" pitchFamily="2" charset="2"/>
+              <a:buChar char="ü"/>
+            </a:pPr>
+            <a:r>
+              <a:rPr lang="de-CH" dirty="0"/>
+              <a:t> The </a:t>
+            </a:r>
+            <a:r>
+              <a:rPr lang="de-CH" dirty="0" err="1"/>
+              <a:t>student</a:t>
+            </a:r>
+            <a:r>
+              <a:rPr lang="de-CH" dirty="0"/>
+              <a:t> is </a:t>
+            </a:r>
+            <a:r>
+              <a:rPr lang="de-CH" dirty="0" err="1"/>
+              <a:t>able</a:t>
+            </a:r>
+            <a:r>
+              <a:rPr lang="de-CH" dirty="0"/>
+              <a:t> to </a:t>
+            </a:r>
+            <a:r>
+              <a:rPr lang="de-CH" dirty="0" err="1"/>
+              <a:t>use</a:t>
+            </a:r>
+            <a:r>
+              <a:rPr lang="de-CH" dirty="0"/>
+              <a:t> </a:t>
+            </a:r>
+            <a:r>
+              <a:rPr lang="de-CH" dirty="0" err="1"/>
+              <a:t>the</a:t>
+            </a:r>
+            <a:r>
+              <a:rPr lang="de-CH" dirty="0"/>
+              <a:t> </a:t>
+            </a:r>
+            <a:r>
+              <a:rPr lang="de-CH" dirty="0" err="1"/>
+              <a:t>concepts</a:t>
+            </a:r>
+            <a:r>
+              <a:rPr lang="de-CH" dirty="0"/>
+              <a:t> to </a:t>
+            </a:r>
+            <a:r>
+              <a:rPr lang="de-CH" dirty="0" err="1"/>
+              <a:t>implement</a:t>
+            </a:r>
+            <a:r>
+              <a:rPr lang="de-CH" dirty="0"/>
+              <a:t> a </a:t>
+            </a:r>
+            <a:r>
+              <a:rPr lang="de-CH" dirty="0" err="1"/>
+              <a:t>complete</a:t>
+            </a:r>
+            <a:r>
+              <a:rPr lang="de-CH" dirty="0"/>
+              <a:t> linear </a:t>
+            </a:r>
+            <a:r>
+              <a:rPr lang="de-CH" dirty="0" err="1"/>
+              <a:t>regression</a:t>
+            </a:r>
+            <a:r>
+              <a:rPr lang="de-CH" dirty="0"/>
+              <a:t> </a:t>
+            </a:r>
+            <a:r>
+              <a:rPr lang="de-CH" dirty="0" err="1"/>
+              <a:t>model</a:t>
+            </a:r>
+            <a:r>
+              <a:rPr lang="de-CH" dirty="0"/>
+              <a:t> from </a:t>
+            </a:r>
+            <a:r>
+              <a:rPr lang="de-CH" dirty="0" err="1"/>
+              <a:t>scratch</a:t>
+            </a:r>
+            <a:endParaRPr lang="de-CH" dirty="0"/>
+          </a:p>
+          <a:p>
+            <a:pPr marL="0" indent="0">
+              <a:buNone/>
+            </a:pPr>
+            <a:endParaRPr lang="en-CH" dirty="0"/>
+          </a:p>
+        </p:txBody>
+      </p:sp>
+    </p:spTree>
+    <p:extLst>
+      <p:ext uri="{BB962C8B-B14F-4D97-AF65-F5344CB8AC3E}">
+        <p14:creationId xmlns:p14="http://schemas.microsoft.com/office/powerpoint/2010/main" val="3069707759"/>
       </p:ext>
     </p:extLst>
   </p:cSld>

</xml_diff>